<commit_message>
up date new version
</commit_message>
<xml_diff>
--- a/Powpoint/วัตถุประสงค์.pptx
+++ b/Powpoint/วัตถุประสงค์.pptx
@@ -321,7 +321,7 @@
           <a:p>
             <a:fld id="{D19988F8-A28F-44CC-B7AC-CD545333AE62}" type="datetimeFigureOut">
               <a:rPr lang="en-US" smtClean="0"/>
-              <a:t>6/9/2020</a:t>
+              <a:t>6/25/2020</a:t>
             </a:fld>
             <a:endParaRPr lang="en-US"/>
           </a:p>
@@ -542,7 +542,7 @@
           <a:p>
             <a:fld id="{D19988F8-A28F-44CC-B7AC-CD545333AE62}" type="datetimeFigureOut">
               <a:rPr lang="en-US" smtClean="0"/>
-              <a:t>6/9/2020</a:t>
+              <a:t>6/25/2020</a:t>
             </a:fld>
             <a:endParaRPr lang="en-US"/>
           </a:p>
@@ -722,7 +722,7 @@
           <a:p>
             <a:fld id="{D19988F8-A28F-44CC-B7AC-CD545333AE62}" type="datetimeFigureOut">
               <a:rPr lang="en-US" smtClean="0"/>
-              <a:t>6/9/2020</a:t>
+              <a:t>6/25/2020</a:t>
             </a:fld>
             <a:endParaRPr lang="en-US"/>
           </a:p>
@@ -892,7 +892,7 @@
           <a:p>
             <a:fld id="{D19988F8-A28F-44CC-B7AC-CD545333AE62}" type="datetimeFigureOut">
               <a:rPr lang="en-US" smtClean="0"/>
-              <a:t>6/9/2020</a:t>
+              <a:t>6/25/2020</a:t>
             </a:fld>
             <a:endParaRPr lang="en-US"/>
           </a:p>
@@ -1143,7 +1143,7 @@
           <a:p>
             <a:fld id="{D19988F8-A28F-44CC-B7AC-CD545333AE62}" type="datetimeFigureOut">
               <a:rPr lang="en-US" smtClean="0"/>
-              <a:t>6/9/2020</a:t>
+              <a:t>6/25/2020</a:t>
             </a:fld>
             <a:endParaRPr lang="en-US"/>
           </a:p>
@@ -1466,7 +1466,7 @@
           <a:p>
             <a:fld id="{D19988F8-A28F-44CC-B7AC-CD545333AE62}" type="datetimeFigureOut">
               <a:rPr lang="en-US" smtClean="0"/>
-              <a:t>6/9/2020</a:t>
+              <a:t>6/25/2020</a:t>
             </a:fld>
             <a:endParaRPr lang="en-US"/>
           </a:p>
@@ -1890,7 +1890,7 @@
           <a:p>
             <a:fld id="{D19988F8-A28F-44CC-B7AC-CD545333AE62}" type="datetimeFigureOut">
               <a:rPr lang="en-US" smtClean="0"/>
-              <a:t>6/9/2020</a:t>
+              <a:t>6/25/2020</a:t>
             </a:fld>
             <a:endParaRPr lang="en-US"/>
           </a:p>
@@ -2008,7 +2008,7 @@
           <a:p>
             <a:fld id="{D19988F8-A28F-44CC-B7AC-CD545333AE62}" type="datetimeFigureOut">
               <a:rPr lang="en-US" smtClean="0"/>
-              <a:t>6/9/2020</a:t>
+              <a:t>6/25/2020</a:t>
             </a:fld>
             <a:endParaRPr lang="en-US"/>
           </a:p>
@@ -2103,7 +2103,7 @@
           <a:p>
             <a:fld id="{D19988F8-A28F-44CC-B7AC-CD545333AE62}" type="datetimeFigureOut">
               <a:rPr lang="en-US" smtClean="0"/>
-              <a:t>6/9/2020</a:t>
+              <a:t>6/25/2020</a:t>
             </a:fld>
             <a:endParaRPr lang="en-US"/>
           </a:p>
@@ -2393,7 +2393,7 @@
           <a:p>
             <a:fld id="{D19988F8-A28F-44CC-B7AC-CD545333AE62}" type="datetimeFigureOut">
               <a:rPr lang="en-US" smtClean="0"/>
-              <a:t>6/9/2020</a:t>
+              <a:t>6/25/2020</a:t>
             </a:fld>
             <a:endParaRPr lang="en-US"/>
           </a:p>
@@ -2665,7 +2665,7 @@
           <a:p>
             <a:fld id="{D19988F8-A28F-44CC-B7AC-CD545333AE62}" type="datetimeFigureOut">
               <a:rPr lang="en-US" smtClean="0"/>
-              <a:t>6/9/2020</a:t>
+              <a:t>6/25/2020</a:t>
             </a:fld>
             <a:endParaRPr lang="en-US"/>
           </a:p>
@@ -2919,7 +2919,7 @@
           <a:p>
             <a:fld id="{D19988F8-A28F-44CC-B7AC-CD545333AE62}" type="datetimeFigureOut">
               <a:rPr lang="en-US" smtClean="0"/>
-              <a:t>6/9/2020</a:t>
+              <a:t>6/25/2020</a:t>
             </a:fld>
             <a:endParaRPr lang="en-US"/>
           </a:p>
@@ -3408,14 +3408,7 @@
                 <a:latin typeface="TH SarabunPSK" panose="020B0500040200020003" pitchFamily="34" charset="-34"/>
                 <a:cs typeface="TH SarabunPSK" panose="020B0500040200020003" pitchFamily="34" charset="-34"/>
               </a:rPr>
-              <a:t>Pointing </a:t>
-            </a:r>
-            <a:r>
-              <a:rPr lang="en-US" sz="5400" dirty="0" smtClean="0">
-                <a:latin typeface="TH SarabunPSK" panose="020B0500040200020003" pitchFamily="34" charset="-34"/>
-                <a:cs typeface="TH SarabunPSK" panose="020B0500040200020003" pitchFamily="34" charset="-34"/>
-              </a:rPr>
-              <a:t>Model API</a:t>
+              <a:t>Pointing Model API</a:t>
             </a:r>
             <a:endParaRPr lang="en-US" sz="5400" dirty="0">
               <a:latin typeface="TH SarabunPSK" panose="020B0500040200020003" pitchFamily="34" charset="-34"/>
@@ -4972,28 +4965,14 @@
                 <a:latin typeface="TH SarabunPSK" panose="020B0500040200020003" pitchFamily="34" charset="-34"/>
                 <a:cs typeface="TH SarabunPSK" panose="020B0500040200020003" pitchFamily="34" charset="-34"/>
               </a:rPr>
-              <a:t>1.</a:t>
-            </a:r>
-            <a:r>
-              <a:rPr lang="en-US" dirty="0" smtClean="0">
-                <a:latin typeface="TH SarabunPSK" panose="020B0500040200020003" pitchFamily="34" charset="-34"/>
-                <a:cs typeface="TH SarabunPSK" panose="020B0500040200020003" pitchFamily="34" charset="-34"/>
-              </a:rPr>
-              <a:t> </a:t>
+              <a:t>1. </a:t>
             </a:r>
             <a:r>
               <a:rPr lang="th-TH" dirty="0" smtClean="0">
                 <a:latin typeface="TH SarabunPSK" panose="020B0500040200020003" pitchFamily="34" charset="-34"/>
                 <a:cs typeface="TH SarabunPSK" panose="020B0500040200020003" pitchFamily="34" charset="-34"/>
               </a:rPr>
-              <a:t>เชื่อมต่อ</a:t>
-            </a:r>
-            <a:r>
-              <a:rPr lang="th-TH" dirty="0" smtClean="0">
-                <a:latin typeface="TH SarabunPSK" panose="020B0500040200020003" pitchFamily="34" charset="-34"/>
-                <a:cs typeface="TH SarabunPSK" panose="020B0500040200020003" pitchFamily="34" charset="-34"/>
-              </a:rPr>
-              <a:t>ฐานข้อมูล </a:t>
+              <a:t>เชื่อมต่อฐานข้อมูล </a:t>
             </a:r>
             <a:r>
               <a:rPr lang="en-US" dirty="0" smtClean="0">
@@ -5002,10 +4981,6 @@
               </a:rPr>
               <a:t>MongoDB </a:t>
             </a:r>
-            <a:endParaRPr lang="en-US" dirty="0" smtClean="0">
-              <a:latin typeface="TH SarabunPSK" panose="020B0500040200020003" pitchFamily="34" charset="-34"/>
-              <a:cs typeface="TH SarabunPSK" panose="020B0500040200020003" pitchFamily="34" charset="-34"/>
-            </a:endParaRPr>
           </a:p>
           <a:p>
             <a:pPr marL="342900" indent="-342900" algn="l">
@@ -5017,14 +4992,7 @@
                 <a:latin typeface="TH SarabunPSK" panose="020B0500040200020003" pitchFamily="34" charset="-34"/>
                 <a:cs typeface="TH SarabunPSK" panose="020B0500040200020003" pitchFamily="34" charset="-34"/>
               </a:rPr>
-              <a:t>2.</a:t>
-            </a:r>
-            <a:r>
-              <a:rPr lang="en-US" dirty="0" smtClean="0">
-                <a:latin typeface="TH SarabunPSK" panose="020B0500040200020003" pitchFamily="34" charset="-34"/>
-                <a:cs typeface="TH SarabunPSK" panose="020B0500040200020003" pitchFamily="34" charset="-34"/>
-              </a:rPr>
-              <a:t> </a:t>
+              <a:t>2. </a:t>
             </a:r>
             <a:r>
               <a:rPr lang="th-TH" dirty="0" smtClean="0">
@@ -5045,35 +5013,21 @@
                 <a:latin typeface="TH SarabunPSK" panose="020B0500040200020003" pitchFamily="34" charset="-34"/>
                 <a:cs typeface="TH SarabunPSK" panose="020B0500040200020003" pitchFamily="34" charset="-34"/>
               </a:rPr>
-              <a:t>ข้อออกมา</a:t>
+              <a:t>ข้อออกมาใน</a:t>
+            </a:r>
+            <a:r>
+              <a:rPr lang="en-US" dirty="0" smtClean="0">
+                <a:latin typeface="TH SarabunPSK" panose="020B0500040200020003" pitchFamily="34" charset="-34"/>
+                <a:cs typeface="TH SarabunPSK" panose="020B0500040200020003" pitchFamily="34" charset="-34"/>
+              </a:rPr>
+              <a:t>3</a:t>
             </a:r>
             <a:r>
               <a:rPr lang="th-TH" dirty="0" smtClean="0">
                 <a:latin typeface="TH SarabunPSK" panose="020B0500040200020003" pitchFamily="34" charset="-34"/>
                 <a:cs typeface="TH SarabunPSK" panose="020B0500040200020003" pitchFamily="34" charset="-34"/>
               </a:rPr>
-              <a:t>ใน</a:t>
-            </a:r>
-            <a:r>
-              <a:rPr lang="en-US" dirty="0" smtClean="0">
-                <a:latin typeface="TH SarabunPSK" panose="020B0500040200020003" pitchFamily="34" charset="-34"/>
-                <a:cs typeface="TH SarabunPSK" panose="020B0500040200020003" pitchFamily="34" charset="-34"/>
-              </a:rPr>
-              <a:t>3</a:t>
-            </a:r>
-            <a:r>
-              <a:rPr lang="th-TH" dirty="0" smtClean="0">
-                <a:latin typeface="TH SarabunPSK" panose="020B0500040200020003" pitchFamily="34" charset="-34"/>
-                <a:cs typeface="TH SarabunPSK" panose="020B0500040200020003" pitchFamily="34" charset="-34"/>
-              </a:rPr>
-              <a:t>วิธี</a:t>
-            </a:r>
-            <a:r>
-              <a:rPr lang="th-TH" dirty="0" smtClean="0">
-                <a:latin typeface="TH SarabunPSK" panose="020B0500040200020003" pitchFamily="34" charset="-34"/>
-                <a:cs typeface="TH SarabunPSK" panose="020B0500040200020003" pitchFamily="34" charset="-34"/>
-              </a:rPr>
-              <a:t>ดังนี้</a:t>
+              <a:t>วิธีดังนี้</a:t>
             </a:r>
             <a:endParaRPr lang="en-US" dirty="0">
               <a:latin typeface="TH SarabunPSK" panose="020B0500040200020003" pitchFamily="34" charset="-34"/>
@@ -5130,14 +5084,7 @@
                 <a:latin typeface="TH SarabunPSK" panose="020B0500040200020003" pitchFamily="34" charset="-34"/>
                 <a:cs typeface="TH SarabunPSK" panose="020B0500040200020003" pitchFamily="34" charset="-34"/>
               </a:rPr>
-              <a:t>  - </a:t>
-            </a:r>
-            <a:r>
-              <a:rPr lang="en-US" sz="2000" dirty="0" smtClean="0">
-                <a:latin typeface="TH SarabunPSK" panose="020B0500040200020003" pitchFamily="34" charset="-34"/>
-                <a:cs typeface="TH SarabunPSK" panose="020B0500040200020003" pitchFamily="34" charset="-34"/>
-              </a:rPr>
-              <a:t>Polygon</a:t>
+              <a:t>  - Polygon</a:t>
             </a:r>
             <a:endParaRPr lang="en-US" dirty="0" smtClean="0">
               <a:latin typeface="TH SarabunPSK" panose="020B0500040200020003" pitchFamily="34" charset="-34"/>
@@ -5188,14 +5135,7 @@
                 <a:latin typeface="TH SarabunPSK" panose="020B0500040200020003" pitchFamily="34" charset="-34"/>
                 <a:cs typeface="TH SarabunPSK" panose="020B0500040200020003" pitchFamily="34" charset="-34"/>
               </a:rPr>
-              <a:t>4.</a:t>
-            </a:r>
-            <a:r>
-              <a:rPr lang="en-US" dirty="0" smtClean="0">
-                <a:latin typeface="TH SarabunPSK" panose="020B0500040200020003" pitchFamily="34" charset="-34"/>
-                <a:cs typeface="TH SarabunPSK" panose="020B0500040200020003" pitchFamily="34" charset="-34"/>
-              </a:rPr>
-              <a:t> EMGUCV </a:t>
+              <a:t>4. EMGUCV </a:t>
             </a:r>
             <a:r>
               <a:rPr lang="th-TH" dirty="0" smtClean="0">
@@ -5209,14 +5149,7 @@
                 <a:latin typeface="TH SarabunPSK" panose="020B0500040200020003" pitchFamily="34" charset="-34"/>
                 <a:cs typeface="TH SarabunPSK" panose="020B0500040200020003" pitchFamily="34" charset="-34"/>
               </a:rPr>
-              <a:t>H</a:t>
-            </a:r>
-            <a:r>
-              <a:rPr lang="en-US" dirty="0" smtClean="0">
-                <a:latin typeface="TH SarabunPSK" panose="020B0500040200020003" pitchFamily="34" charset="-34"/>
-                <a:cs typeface="TH SarabunPSK" panose="020B0500040200020003" pitchFamily="34" charset="-34"/>
-              </a:rPr>
-              <a:t>ough Circles</a:t>
+              <a:t>Hough Circles</a:t>
             </a:r>
           </a:p>
           <a:p>
@@ -5229,14 +5162,7 @@
                 <a:latin typeface="TH SarabunPSK" panose="020B0500040200020003" pitchFamily="34" charset="-34"/>
                 <a:cs typeface="TH SarabunPSK" panose="020B0500040200020003" pitchFamily="34" charset="-34"/>
               </a:rPr>
-              <a:t>5.</a:t>
-            </a:r>
-            <a:r>
-              <a:rPr lang="en-US" dirty="0" smtClean="0">
-                <a:latin typeface="TH SarabunPSK" panose="020B0500040200020003" pitchFamily="34" charset="-34"/>
-                <a:cs typeface="TH SarabunPSK" panose="020B0500040200020003" pitchFamily="34" charset="-34"/>
-              </a:rPr>
-              <a:t> </a:t>
+              <a:t>5. </a:t>
             </a:r>
             <a:r>
               <a:rPr lang="th-TH" dirty="0" smtClean="0">
@@ -8044,11 +7970,7 @@
           <a:p>
             <a:r>
               <a:rPr lang="en-US" dirty="0" smtClean="0"/>
-              <a:t>Class </a:t>
-            </a:r>
-            <a:r>
-              <a:rPr lang="en-US" dirty="0" smtClean="0"/>
-              <a:t>diagram</a:t>
+              <a:t>Class diagram</a:t>
             </a:r>
             <a:r>
               <a:rPr lang="th-TH" dirty="0" smtClean="0"/>
@@ -8498,7 +8420,7 @@
         </p:nvSpPr>
         <p:spPr>
           <a:xfrm>
-            <a:off x="1393370" y="1645920"/>
+            <a:off x="440059" y="1781294"/>
             <a:ext cx="5947955" cy="4641669"/>
           </a:xfrm>
           <a:prstGeom prst="rect">
@@ -8546,7 +8468,7 @@
         </p:nvSpPr>
         <p:spPr>
           <a:xfrm>
-            <a:off x="1393371" y="1645920"/>
+            <a:off x="440060" y="1781294"/>
             <a:ext cx="5947954" cy="369332"/>
           </a:xfrm>
           <a:prstGeom prst="rect">
@@ -8606,8 +8528,8 @@
         </p:nvSpPr>
         <p:spPr>
           <a:xfrm>
-            <a:off x="1393371" y="2015252"/>
-            <a:ext cx="5947954" cy="1200329"/>
+            <a:off x="440060" y="2150626"/>
+            <a:ext cx="5947954" cy="2031325"/>
           </a:xfrm>
           <a:prstGeom prst="rect">
             <a:avLst/>
@@ -8643,43 +8565,92 @@
           </a:bodyPr>
           <a:lstStyle/>
           <a:p>
-            <a:pPr marL="285750" indent="-285750">
-              <a:buFontTx/>
-              <a:buChar char="-"/>
-            </a:pPr>
+            <a:r>
+              <a:rPr lang="en-US" dirty="0" smtClean="0">
+                <a:latin typeface="TH SarabunPSK" panose="020B0500040200020003" pitchFamily="34" charset="-34"/>
+                <a:cs typeface="TH SarabunPSK" panose="020B0500040200020003" pitchFamily="34" charset="-34"/>
+              </a:rPr>
+              <a:t>- </a:t>
+            </a:r>
+            <a:r>
+              <a:rPr lang="en-US" dirty="0">
+                <a:latin typeface="TH SarabunPSK" panose="020B0500040200020003" pitchFamily="34" charset="-34"/>
+                <a:cs typeface="TH SarabunPSK" panose="020B0500040200020003" pitchFamily="34" charset="-34"/>
+              </a:rPr>
+              <a:t>Matrix&lt;</a:t>
+            </a:r>
             <a:r>
               <a:rPr lang="en-US" dirty="0" err="1">
                 <a:latin typeface="TH SarabunPSK" panose="020B0500040200020003" pitchFamily="34" charset="-34"/>
                 <a:cs typeface="TH SarabunPSK" panose="020B0500040200020003" pitchFamily="34" charset="-34"/>
               </a:rPr>
-              <a:t>n</a:t>
-            </a:r>
-            <a:r>
-              <a:rPr lang="en-US" dirty="0" err="1" smtClean="0">
-                <a:latin typeface="TH SarabunPSK" panose="020B0500040200020003" pitchFamily="34" charset="-34"/>
-                <a:cs typeface="TH SarabunPSK" panose="020B0500040200020003" pitchFamily="34" charset="-34"/>
-              </a:rPr>
-              <a:t>ewimage</a:t>
-            </a:r>
-            <a:r>
-              <a:rPr lang="en-US" dirty="0" smtClean="0">
-                <a:latin typeface="TH SarabunPSK" panose="020B0500040200020003" pitchFamily="34" charset="-34"/>
-                <a:cs typeface="TH SarabunPSK" panose="020B0500040200020003" pitchFamily="34" charset="-34"/>
-              </a:rPr>
-              <a:t> : </a:t>
+              <a:t>int</a:t>
             </a:r>
             <a:r>
               <a:rPr lang="en-US" dirty="0">
                 <a:latin typeface="TH SarabunPSK" panose="020B0500040200020003" pitchFamily="34" charset="-34"/>
                 <a:cs typeface="TH SarabunPSK" panose="020B0500040200020003" pitchFamily="34" charset="-34"/>
               </a:rPr>
-              <a:t>Image&lt;</a:t>
+              <a:t>&gt; raw8bit;</a:t>
+            </a:r>
+          </a:p>
+          <a:p>
+            <a:r>
+              <a:rPr lang="en-US" dirty="0" smtClean="0">
+                <a:latin typeface="TH SarabunPSK" panose="020B0500040200020003" pitchFamily="34" charset="-34"/>
+                <a:cs typeface="TH SarabunPSK" panose="020B0500040200020003" pitchFamily="34" charset="-34"/>
+              </a:rPr>
+              <a:t>- </a:t>
             </a:r>
             <a:r>
               <a:rPr lang="en-US" dirty="0" err="1">
                 <a:latin typeface="TH SarabunPSK" panose="020B0500040200020003" pitchFamily="34" charset="-34"/>
                 <a:cs typeface="TH SarabunPSK" panose="020B0500040200020003" pitchFamily="34" charset="-34"/>
               </a:rPr>
+              <a:t>MethodStaticFomula</a:t>
+            </a:r>
+            <a:r>
+              <a:rPr lang="en-US" dirty="0">
+                <a:latin typeface="TH SarabunPSK" panose="020B0500040200020003" pitchFamily="34" charset="-34"/>
+                <a:cs typeface="TH SarabunPSK" panose="020B0500040200020003" pitchFamily="34" charset="-34"/>
+              </a:rPr>
+              <a:t> </a:t>
+            </a:r>
+            <a:r>
+              <a:rPr lang="en-US" dirty="0" err="1">
+                <a:latin typeface="TH SarabunPSK" panose="020B0500040200020003" pitchFamily="34" charset="-34"/>
+                <a:cs typeface="TH SarabunPSK" panose="020B0500040200020003" pitchFamily="34" charset="-34"/>
+              </a:rPr>
+              <a:t>fomula</a:t>
+            </a:r>
+            <a:r>
+              <a:rPr lang="en-US" dirty="0">
+                <a:latin typeface="TH SarabunPSK" panose="020B0500040200020003" pitchFamily="34" charset="-34"/>
+                <a:cs typeface="TH SarabunPSK" panose="020B0500040200020003" pitchFamily="34" charset="-34"/>
+              </a:rPr>
+              <a:t>;</a:t>
+            </a:r>
+          </a:p>
+          <a:p>
+            <a:r>
+              <a:rPr lang="en-US" dirty="0" smtClean="0">
+                <a:latin typeface="TH SarabunPSK" panose="020B0500040200020003" pitchFamily="34" charset="-34"/>
+                <a:cs typeface="TH SarabunPSK" panose="020B0500040200020003" pitchFamily="34" charset="-34"/>
+              </a:rPr>
+              <a:t>- jpg</a:t>
+            </a:r>
+            <a:r>
+              <a:rPr lang="en-US" dirty="0">
+                <a:latin typeface="TH SarabunPSK" panose="020B0500040200020003" pitchFamily="34" charset="-34"/>
+                <a:cs typeface="TH SarabunPSK" panose="020B0500040200020003" pitchFamily="34" charset="-34"/>
+              </a:rPr>
+              <a:t> Image&lt;</a:t>
+            </a:r>
+            <a:r>
+              <a:rPr lang="en-US" dirty="0" err="1">
+                <a:latin typeface="TH SarabunPSK" panose="020B0500040200020003" pitchFamily="34" charset="-34"/>
+                <a:cs typeface="TH SarabunPSK" panose="020B0500040200020003" pitchFamily="34" charset="-34"/>
+              </a:rPr>
               <a:t>Bgr</a:t>
             </a:r>
             <a:r>
@@ -8687,122 +8658,226 @@
                 <a:latin typeface="TH SarabunPSK" panose="020B0500040200020003" pitchFamily="34" charset="-34"/>
                 <a:cs typeface="TH SarabunPSK" panose="020B0500040200020003" pitchFamily="34" charset="-34"/>
               </a:rPr>
-              <a:t>, byte</a:t>
-            </a:r>
-            <a:r>
-              <a:rPr lang="en-US" dirty="0" smtClean="0">
-                <a:latin typeface="TH SarabunPSK" panose="020B0500040200020003" pitchFamily="34" charset="-34"/>
-                <a:cs typeface="TH SarabunPSK" panose="020B0500040200020003" pitchFamily="34" charset="-34"/>
-              </a:rPr>
-              <a:t>&gt;</a:t>
-            </a:r>
-          </a:p>
-          <a:p>
-            <a:pPr marL="285750" indent="-285750">
-              <a:buFontTx/>
-              <a:buChar char="-"/>
-            </a:pPr>
-            <a:r>
-              <a:rPr lang="en-US" dirty="0" err="1" smtClean="0">
-                <a:latin typeface="TH SarabunPSK" panose="020B0500040200020003" pitchFamily="34" charset="-34"/>
-                <a:cs typeface="TH SarabunPSK" panose="020B0500040200020003" pitchFamily="34" charset="-34"/>
-              </a:rPr>
-              <a:t>Imagemat</a:t>
-            </a:r>
-            <a:r>
-              <a:rPr lang="en-US" dirty="0" smtClean="0">
-                <a:latin typeface="TH SarabunPSK" panose="020B0500040200020003" pitchFamily="34" charset="-34"/>
-                <a:cs typeface="TH SarabunPSK" panose="020B0500040200020003" pitchFamily="34" charset="-34"/>
-              </a:rPr>
-              <a:t> : Mat</a:t>
-            </a:r>
-          </a:p>
-          <a:p>
-            <a:pPr marL="285750" indent="-285750">
-              <a:buFontTx/>
-              <a:buChar char="-"/>
-            </a:pPr>
-            <a:r>
-              <a:rPr lang="en-US" dirty="0" smtClean="0">
-                <a:latin typeface="TH SarabunPSK" panose="020B0500040200020003" pitchFamily="34" charset="-34"/>
-                <a:cs typeface="TH SarabunPSK" panose="020B0500040200020003" pitchFamily="34" charset="-34"/>
-              </a:rPr>
-              <a:t>gray : </a:t>
-            </a:r>
-            <a:r>
-              <a:rPr lang="en-US" dirty="0">
-                <a:latin typeface="TH SarabunPSK" panose="020B0500040200020003" pitchFamily="34" charset="-34"/>
-                <a:cs typeface="TH SarabunPSK" panose="020B0500040200020003" pitchFamily="34" charset="-34"/>
-              </a:rPr>
-              <a:t>Image&lt;</a:t>
-            </a:r>
-            <a:r>
-              <a:rPr lang="en-US" dirty="0" err="1">
-                <a:latin typeface="TH SarabunPSK" panose="020B0500040200020003" pitchFamily="34" charset="-34"/>
-                <a:cs typeface="TH SarabunPSK" panose="020B0500040200020003" pitchFamily="34" charset="-34"/>
-              </a:rPr>
-              <a:t>Emgu.CV.Structure.Gray</a:t>
-            </a:r>
-            <a:r>
-              <a:rPr lang="en-US" dirty="0">
-                <a:latin typeface="TH SarabunPSK" panose="020B0500040200020003" pitchFamily="34" charset="-34"/>
-                <a:cs typeface="TH SarabunPSK" panose="020B0500040200020003" pitchFamily="34" charset="-34"/>
-              </a:rPr>
-              <a:t>, byte</a:t>
-            </a:r>
-            <a:r>
-              <a:rPr lang="en-US" dirty="0" smtClean="0">
-                <a:latin typeface="TH SarabunPSK" panose="020B0500040200020003" pitchFamily="34" charset="-34"/>
-                <a:cs typeface="TH SarabunPSK" panose="020B0500040200020003" pitchFamily="34" charset="-34"/>
-              </a:rPr>
-              <a:t>&gt;</a:t>
-            </a:r>
-          </a:p>
-          <a:p>
-            <a:pPr marL="285750" indent="-285750">
-              <a:buFontTx/>
-              <a:buChar char="-"/>
-            </a:pPr>
-            <a:r>
-              <a:rPr lang="en-US" dirty="0" err="1" smtClean="0">
-                <a:latin typeface="TH SarabunPSK" panose="020B0500040200020003" pitchFamily="34" charset="-34"/>
-                <a:cs typeface="TH SarabunPSK" panose="020B0500040200020003" pitchFamily="34" charset="-34"/>
-              </a:rPr>
-              <a:t>Thresholdimage</a:t>
-            </a:r>
-            <a:r>
-              <a:rPr lang="en-US" dirty="0" smtClean="0">
-                <a:latin typeface="TH SarabunPSK" panose="020B0500040200020003" pitchFamily="34" charset="-34"/>
-                <a:cs typeface="TH SarabunPSK" panose="020B0500040200020003" pitchFamily="34" charset="-34"/>
-              </a:rPr>
-              <a:t> : </a:t>
-            </a:r>
-            <a:r>
-              <a:rPr lang="en-US" dirty="0">
-                <a:latin typeface="TH SarabunPSK" panose="020B0500040200020003" pitchFamily="34" charset="-34"/>
-                <a:cs typeface="TH SarabunPSK" panose="020B0500040200020003" pitchFamily="34" charset="-34"/>
-              </a:rPr>
-              <a:t>Image&lt;</a:t>
-            </a:r>
-            <a:r>
-              <a:rPr lang="en-US" dirty="0" err="1">
-                <a:latin typeface="TH SarabunPSK" panose="020B0500040200020003" pitchFamily="34" charset="-34"/>
-                <a:cs typeface="TH SarabunPSK" panose="020B0500040200020003" pitchFamily="34" charset="-34"/>
-              </a:rPr>
-              <a:t>Emgu.CV.Structure.Gray</a:t>
-            </a:r>
-            <a:r>
-              <a:rPr lang="en-US" dirty="0">
-                <a:latin typeface="TH SarabunPSK" panose="020B0500040200020003" pitchFamily="34" charset="-34"/>
-                <a:cs typeface="TH SarabunPSK" panose="020B0500040200020003" pitchFamily="34" charset="-34"/>
-              </a:rPr>
               <a:t>, byte&gt;</a:t>
+            </a:r>
+            <a:r>
+              <a:rPr lang="en-US" dirty="0" smtClean="0">
+                <a:latin typeface="TH SarabunPSK" panose="020B0500040200020003" pitchFamily="34" charset="-34"/>
+                <a:cs typeface="TH SarabunPSK" panose="020B0500040200020003" pitchFamily="34" charset="-34"/>
+              </a:rPr>
+              <a:t>;</a:t>
             </a:r>
             <a:endParaRPr lang="en-US" dirty="0">
               <a:latin typeface="TH SarabunPSK" panose="020B0500040200020003" pitchFamily="34" charset="-34"/>
               <a:cs typeface="TH SarabunPSK" panose="020B0500040200020003" pitchFamily="34" charset="-34"/>
             </a:endParaRPr>
           </a:p>
+          <a:p>
+            <a:r>
+              <a:rPr lang="en-US" dirty="0" smtClean="0">
+                <a:latin typeface="TH SarabunPSK" panose="020B0500040200020003" pitchFamily="34" charset="-34"/>
+                <a:cs typeface="TH SarabunPSK" panose="020B0500040200020003" pitchFamily="34" charset="-34"/>
+              </a:rPr>
+              <a:t>- raw</a:t>
+            </a:r>
+            <a:r>
+              <a:rPr lang="en-US" dirty="0">
+                <a:latin typeface="TH SarabunPSK" panose="020B0500040200020003" pitchFamily="34" charset="-34"/>
+                <a:cs typeface="TH SarabunPSK" panose="020B0500040200020003" pitchFamily="34" charset="-34"/>
+              </a:rPr>
+              <a:t> Image&lt;</a:t>
+            </a:r>
+            <a:r>
+              <a:rPr lang="en-US" dirty="0" err="1">
+                <a:latin typeface="TH SarabunPSK" panose="020B0500040200020003" pitchFamily="34" charset="-34"/>
+                <a:cs typeface="TH SarabunPSK" panose="020B0500040200020003" pitchFamily="34" charset="-34"/>
+              </a:rPr>
+              <a:t>Bgr</a:t>
+            </a:r>
+            <a:r>
+              <a:rPr lang="en-US" dirty="0">
+                <a:latin typeface="TH SarabunPSK" panose="020B0500040200020003" pitchFamily="34" charset="-34"/>
+                <a:cs typeface="TH SarabunPSK" panose="020B0500040200020003" pitchFamily="34" charset="-34"/>
+              </a:rPr>
+              <a:t>, byte&gt;</a:t>
+            </a:r>
+            <a:r>
+              <a:rPr lang="en-US" dirty="0" smtClean="0">
+                <a:latin typeface="TH SarabunPSK" panose="020B0500040200020003" pitchFamily="34" charset="-34"/>
+                <a:cs typeface="TH SarabunPSK" panose="020B0500040200020003" pitchFamily="34" charset="-34"/>
+              </a:rPr>
+              <a:t>;</a:t>
+            </a:r>
+            <a:endParaRPr lang="en-US" dirty="0">
+              <a:latin typeface="TH SarabunPSK" panose="020B0500040200020003" pitchFamily="34" charset="-34"/>
+              <a:cs typeface="TH SarabunPSK" panose="020B0500040200020003" pitchFamily="34" charset="-34"/>
+            </a:endParaRPr>
+          </a:p>
+          <a:p>
+            <a:r>
+              <a:rPr lang="en-US" dirty="0" smtClean="0">
+                <a:latin typeface="TH SarabunPSK" panose="020B0500040200020003" pitchFamily="34" charset="-34"/>
+                <a:cs typeface="TH SarabunPSK" panose="020B0500040200020003" pitchFamily="34" charset="-34"/>
+              </a:rPr>
+              <a:t>- </a:t>
+            </a:r>
+            <a:r>
+              <a:rPr lang="en-US" dirty="0" err="1" smtClean="0">
+                <a:latin typeface="TH SarabunPSK" panose="020B0500040200020003" pitchFamily="34" charset="-34"/>
+                <a:cs typeface="TH SarabunPSK" panose="020B0500040200020003" pitchFamily="34" charset="-34"/>
+              </a:rPr>
+              <a:t>Grayjpg</a:t>
+            </a:r>
+            <a:r>
+              <a:rPr lang="en-US" dirty="0" smtClean="0">
+                <a:latin typeface="TH SarabunPSK" panose="020B0500040200020003" pitchFamily="34" charset="-34"/>
+                <a:cs typeface="TH SarabunPSK" panose="020B0500040200020003" pitchFamily="34" charset="-34"/>
+              </a:rPr>
+              <a:t> </a:t>
+            </a:r>
+            <a:r>
+              <a:rPr lang="en-US" dirty="0">
+                <a:latin typeface="TH SarabunPSK" panose="020B0500040200020003" pitchFamily="34" charset="-34"/>
+                <a:cs typeface="TH SarabunPSK" panose="020B0500040200020003" pitchFamily="34" charset="-34"/>
+              </a:rPr>
+              <a:t>Image&lt;</a:t>
+            </a:r>
+            <a:r>
+              <a:rPr lang="en-US" dirty="0" err="1">
+                <a:latin typeface="TH SarabunPSK" panose="020B0500040200020003" pitchFamily="34" charset="-34"/>
+                <a:cs typeface="TH SarabunPSK" panose="020B0500040200020003" pitchFamily="34" charset="-34"/>
+              </a:rPr>
+              <a:t>Emgu.CV.Structure.Gray</a:t>
+            </a:r>
+            <a:r>
+              <a:rPr lang="en-US" dirty="0">
+                <a:latin typeface="TH SarabunPSK" panose="020B0500040200020003" pitchFamily="34" charset="-34"/>
+                <a:cs typeface="TH SarabunPSK" panose="020B0500040200020003" pitchFamily="34" charset="-34"/>
+              </a:rPr>
+              <a:t>, byte&gt; </a:t>
+            </a:r>
+            <a:r>
+              <a:rPr lang="en-US" dirty="0" smtClean="0">
+                <a:latin typeface="TH SarabunPSK" panose="020B0500040200020003" pitchFamily="34" charset="-34"/>
+                <a:cs typeface="TH SarabunPSK" panose="020B0500040200020003" pitchFamily="34" charset="-34"/>
+              </a:rPr>
+              <a:t>;</a:t>
+            </a:r>
+            <a:endParaRPr lang="en-US" dirty="0">
+              <a:latin typeface="TH SarabunPSK" panose="020B0500040200020003" pitchFamily="34" charset="-34"/>
+              <a:cs typeface="TH SarabunPSK" panose="020B0500040200020003" pitchFamily="34" charset="-34"/>
+            </a:endParaRPr>
+          </a:p>
+          <a:p>
+            <a:r>
+              <a:rPr lang="en-US" dirty="0" smtClean="0">
+                <a:latin typeface="TH SarabunPSK" panose="020B0500040200020003" pitchFamily="34" charset="-34"/>
+                <a:cs typeface="TH SarabunPSK" panose="020B0500040200020003" pitchFamily="34" charset="-34"/>
+              </a:rPr>
+              <a:t>- </a:t>
+            </a:r>
+            <a:r>
+              <a:rPr lang="en-US" dirty="0" err="1" smtClean="0">
+                <a:latin typeface="TH SarabunPSK" panose="020B0500040200020003" pitchFamily="34" charset="-34"/>
+                <a:cs typeface="TH SarabunPSK" panose="020B0500040200020003" pitchFamily="34" charset="-34"/>
+              </a:rPr>
+              <a:t>Grayraw</a:t>
+            </a:r>
+            <a:r>
+              <a:rPr lang="en-US" dirty="0" smtClean="0">
+                <a:latin typeface="TH SarabunPSK" panose="020B0500040200020003" pitchFamily="34" charset="-34"/>
+                <a:cs typeface="TH SarabunPSK" panose="020B0500040200020003" pitchFamily="34" charset="-34"/>
+              </a:rPr>
+              <a:t> </a:t>
+            </a:r>
+            <a:r>
+              <a:rPr lang="en-US" dirty="0">
+                <a:latin typeface="TH SarabunPSK" panose="020B0500040200020003" pitchFamily="34" charset="-34"/>
+                <a:cs typeface="TH SarabunPSK" panose="020B0500040200020003" pitchFamily="34" charset="-34"/>
+              </a:rPr>
+              <a:t>Image&lt;</a:t>
+            </a:r>
+            <a:r>
+              <a:rPr lang="en-US" dirty="0" err="1">
+                <a:latin typeface="TH SarabunPSK" panose="020B0500040200020003" pitchFamily="34" charset="-34"/>
+                <a:cs typeface="TH SarabunPSK" panose="020B0500040200020003" pitchFamily="34" charset="-34"/>
+              </a:rPr>
+              <a:t>Emgu.CV.Structure.Gray</a:t>
+            </a:r>
+            <a:r>
+              <a:rPr lang="en-US" dirty="0">
+                <a:latin typeface="TH SarabunPSK" panose="020B0500040200020003" pitchFamily="34" charset="-34"/>
+                <a:cs typeface="TH SarabunPSK" panose="020B0500040200020003" pitchFamily="34" charset="-34"/>
+              </a:rPr>
+              <a:t>, byte&gt; </a:t>
+            </a:r>
+            <a:r>
+              <a:rPr lang="en-US" dirty="0" smtClean="0">
+                <a:latin typeface="TH SarabunPSK" panose="020B0500040200020003" pitchFamily="34" charset="-34"/>
+                <a:cs typeface="TH SarabunPSK" panose="020B0500040200020003" pitchFamily="34" charset="-34"/>
+              </a:rPr>
+              <a:t>;</a:t>
+            </a:r>
+            <a:endParaRPr lang="en-US" dirty="0">
+              <a:latin typeface="TH SarabunPSK" panose="020B0500040200020003" pitchFamily="34" charset="-34"/>
+              <a:cs typeface="TH SarabunPSK" panose="020B0500040200020003" pitchFamily="34" charset="-34"/>
+            </a:endParaRPr>
+          </a:p>
+          <a:p>
+            <a:r>
+              <a:rPr lang="en-US" dirty="0" smtClean="0">
+                <a:latin typeface="TH SarabunPSK" panose="020B0500040200020003" pitchFamily="34" charset="-34"/>
+                <a:cs typeface="TH SarabunPSK" panose="020B0500040200020003" pitchFamily="34" charset="-34"/>
+              </a:rPr>
+              <a:t>- </a:t>
+            </a:r>
+            <a:r>
+              <a:rPr lang="en-US" dirty="0" err="1" smtClean="0">
+                <a:latin typeface="TH SarabunPSK" panose="020B0500040200020003" pitchFamily="34" charset="-34"/>
+                <a:cs typeface="TH SarabunPSK" panose="020B0500040200020003" pitchFamily="34" charset="-34"/>
+              </a:rPr>
+              <a:t>Thresholdimage</a:t>
+            </a:r>
+            <a:r>
+              <a:rPr lang="en-US" dirty="0" smtClean="0">
+                <a:latin typeface="TH SarabunPSK" panose="020B0500040200020003" pitchFamily="34" charset="-34"/>
+                <a:cs typeface="TH SarabunPSK" panose="020B0500040200020003" pitchFamily="34" charset="-34"/>
+              </a:rPr>
+              <a:t> </a:t>
+            </a:r>
+            <a:r>
+              <a:rPr lang="en-US" dirty="0">
+                <a:latin typeface="TH SarabunPSK" panose="020B0500040200020003" pitchFamily="34" charset="-34"/>
+                <a:cs typeface="TH SarabunPSK" panose="020B0500040200020003" pitchFamily="34" charset="-34"/>
+              </a:rPr>
+              <a:t>Image&lt;</a:t>
+            </a:r>
+            <a:r>
+              <a:rPr lang="en-US" dirty="0" err="1">
+                <a:latin typeface="TH SarabunPSK" panose="020B0500040200020003" pitchFamily="34" charset="-34"/>
+                <a:cs typeface="TH SarabunPSK" panose="020B0500040200020003" pitchFamily="34" charset="-34"/>
+              </a:rPr>
+              <a:t>Emgu.CV.Structure.Gray</a:t>
+            </a:r>
+            <a:r>
+              <a:rPr lang="en-US" dirty="0">
+                <a:latin typeface="TH SarabunPSK" panose="020B0500040200020003" pitchFamily="34" charset="-34"/>
+                <a:cs typeface="TH SarabunPSK" panose="020B0500040200020003" pitchFamily="34" charset="-34"/>
+              </a:rPr>
+              <a:t>, byte&gt; </a:t>
+            </a:r>
+            <a:r>
+              <a:rPr lang="en-US" dirty="0" smtClean="0">
+                <a:latin typeface="TH SarabunPSK" panose="020B0500040200020003" pitchFamily="34" charset="-34"/>
+                <a:cs typeface="TH SarabunPSK" panose="020B0500040200020003" pitchFamily="34" charset="-34"/>
+              </a:rPr>
+              <a:t>;</a:t>
+            </a:r>
+            <a:endParaRPr lang="en-US" dirty="0">
+              <a:latin typeface="TH SarabunPSK" panose="020B0500040200020003" pitchFamily="34" charset="-34"/>
+              <a:cs typeface="TH SarabunPSK" panose="020B0500040200020003" pitchFamily="34" charset="-34"/>
+            </a:endParaRPr>
+          </a:p>
         </p:txBody>
       </p:sp>
       <p:sp>
@@ -8813,7 +8888,7 @@
         </p:nvSpPr>
         <p:spPr>
           <a:xfrm>
-            <a:off x="1393371" y="3215581"/>
+            <a:off x="440058" y="4425294"/>
             <a:ext cx="5947954" cy="1754326"/>
           </a:xfrm>
           <a:prstGeom prst="rect">
@@ -8846,122 +8921,240 @@
               <a:t> </a:t>
             </a:r>
             <a:r>
+              <a:rPr lang="en-US" dirty="0" smtClean="0">
+                <a:latin typeface="TH SarabunPSK" panose="020B0500040200020003" pitchFamily="34" charset="-34"/>
+                <a:cs typeface="TH SarabunPSK" panose="020B0500040200020003" pitchFamily="34" charset="-34"/>
+              </a:rPr>
+              <a:t>() </a:t>
+            </a:r>
+            <a:r>
+              <a:rPr lang="en-US" dirty="0" smtClean="0">
+                <a:latin typeface="TH SarabunPSK" panose="020B0500040200020003" pitchFamily="34" charset="-34"/>
+                <a:cs typeface="TH SarabunPSK" panose="020B0500040200020003" pitchFamily="34" charset="-34"/>
+              </a:rPr>
+              <a:t>: void</a:t>
+            </a:r>
+          </a:p>
+          <a:p>
+            <a:r>
               <a:rPr lang="en-US" dirty="0">
                 <a:latin typeface="TH SarabunPSK" panose="020B0500040200020003" pitchFamily="34" charset="-34"/>
                 <a:cs typeface="TH SarabunPSK" panose="020B0500040200020003" pitchFamily="34" charset="-34"/>
               </a:rPr>
-              <a:t>(string </a:t>
+              <a:t>-</a:t>
+            </a:r>
+            <a:r>
+              <a:rPr lang="en-US" dirty="0" smtClean="0">
+                <a:latin typeface="TH SarabunPSK" panose="020B0500040200020003" pitchFamily="34" charset="-34"/>
+                <a:cs typeface="TH SarabunPSK" panose="020B0500040200020003" pitchFamily="34" charset="-34"/>
+              </a:rPr>
+              <a:t> </a:t>
+            </a:r>
+            <a:r>
+              <a:rPr lang="en-US" dirty="0">
+                <a:latin typeface="TH SarabunPSK" panose="020B0500040200020003" pitchFamily="34" charset="-34"/>
+                <a:cs typeface="TH SarabunPSK" panose="020B0500040200020003" pitchFamily="34" charset="-34"/>
+              </a:rPr>
+              <a:t>Genarate2Jpg</a:t>
+            </a:r>
+            <a:r>
+              <a:rPr lang="en-US" dirty="0" smtClean="0">
+                <a:latin typeface="TH SarabunPSK" panose="020B0500040200020003" pitchFamily="34" charset="-34"/>
+                <a:cs typeface="TH SarabunPSK" panose="020B0500040200020003" pitchFamily="34" charset="-34"/>
+              </a:rPr>
+              <a:t> (</a:t>
+            </a:r>
+            <a:r>
+              <a:rPr lang="en-US" dirty="0">
+                <a:latin typeface="TH SarabunPSK" panose="020B0500040200020003" pitchFamily="34" charset="-34"/>
+                <a:cs typeface="TH SarabunPSK" panose="020B0500040200020003" pitchFamily="34" charset="-34"/>
+              </a:rPr>
+              <a:t>Matrix&lt;</a:t>
             </a:r>
             <a:r>
               <a:rPr lang="en-US" dirty="0" err="1">
                 <a:latin typeface="TH SarabunPSK" panose="020B0500040200020003" pitchFamily="34" charset="-34"/>
                 <a:cs typeface="TH SarabunPSK" panose="020B0500040200020003" pitchFamily="34" charset="-34"/>
               </a:rPr>
-              <a:t>namefile</a:t>
-            </a:r>
-            <a:r>
-              <a:rPr lang="en-US" dirty="0" smtClean="0">
-                <a:latin typeface="TH SarabunPSK" panose="020B0500040200020003" pitchFamily="34" charset="-34"/>
-                <a:cs typeface="TH SarabunPSK" panose="020B0500040200020003" pitchFamily="34" charset="-34"/>
-              </a:rPr>
-              <a:t>) : void</a:t>
-            </a:r>
-          </a:p>
-          <a:p>
-            <a:r>
-              <a:rPr lang="en-US" dirty="0" smtClean="0">
-                <a:latin typeface="TH SarabunPSK" panose="020B0500040200020003" pitchFamily="34" charset="-34"/>
-                <a:cs typeface="TH SarabunPSK" panose="020B0500040200020003" pitchFamily="34" charset="-34"/>
-              </a:rPr>
-              <a:t>+ </a:t>
-            </a:r>
-            <a:r>
-              <a:rPr lang="en-US" dirty="0" err="1" smtClean="0">
-                <a:latin typeface="TH SarabunPSK" panose="020B0500040200020003" pitchFamily="34" charset="-34"/>
-                <a:cs typeface="TH SarabunPSK" panose="020B0500040200020003" pitchFamily="34" charset="-34"/>
-              </a:rPr>
-              <a:t>Thresholding</a:t>
+              <a:t>ushort</a:t>
             </a:r>
             <a:r>
               <a:rPr lang="en-US" dirty="0">
                 <a:latin typeface="TH SarabunPSK" panose="020B0500040200020003" pitchFamily="34" charset="-34"/>
                 <a:cs typeface="TH SarabunPSK" panose="020B0500040200020003" pitchFamily="34" charset="-34"/>
               </a:rPr>
-              <a:t> (</a:t>
-            </a:r>
-            <a:r>
-              <a:rPr lang="en-US" dirty="0" err="1">
-                <a:latin typeface="TH SarabunPSK" panose="020B0500040200020003" pitchFamily="34" charset="-34"/>
-                <a:cs typeface="TH SarabunPSK" panose="020B0500040200020003" pitchFamily="34" charset="-34"/>
-              </a:rPr>
-              <a:t>int</a:t>
-            </a:r>
-            <a:r>
-              <a:rPr lang="en-US" dirty="0">
-                <a:latin typeface="TH SarabunPSK" panose="020B0500040200020003" pitchFamily="34" charset="-34"/>
-                <a:cs typeface="TH SarabunPSK" panose="020B0500040200020003" pitchFamily="34" charset="-34"/>
-              </a:rPr>
-              <a:t> </a:t>
-            </a:r>
-            <a:r>
-              <a:rPr lang="en-US" dirty="0" err="1">
-                <a:latin typeface="TH SarabunPSK" panose="020B0500040200020003" pitchFamily="34" charset="-34"/>
-                <a:cs typeface="TH SarabunPSK" panose="020B0500040200020003" pitchFamily="34" charset="-34"/>
-              </a:rPr>
-              <a:t>min,int</a:t>
-            </a:r>
-            <a:r>
-              <a:rPr lang="en-US" dirty="0">
-                <a:latin typeface="TH SarabunPSK" panose="020B0500040200020003" pitchFamily="34" charset="-34"/>
-                <a:cs typeface="TH SarabunPSK" panose="020B0500040200020003" pitchFamily="34" charset="-34"/>
-              </a:rPr>
-              <a:t> max, </a:t>
-            </a:r>
-            <a:r>
-              <a:rPr lang="en-US" dirty="0" err="1">
-                <a:latin typeface="TH SarabunPSK" panose="020B0500040200020003" pitchFamily="34" charset="-34"/>
-                <a:cs typeface="TH SarabunPSK" panose="020B0500040200020003" pitchFamily="34" charset="-34"/>
-              </a:rPr>
-              <a:t>ThresholdType</a:t>
-            </a:r>
-            <a:r>
-              <a:rPr lang="en-US" dirty="0">
-                <a:latin typeface="TH SarabunPSK" panose="020B0500040200020003" pitchFamily="34" charset="-34"/>
-                <a:cs typeface="TH SarabunPSK" panose="020B0500040200020003" pitchFamily="34" charset="-34"/>
-              </a:rPr>
-              <a:t> </a:t>
-            </a:r>
-            <a:r>
-              <a:rPr lang="en-US" dirty="0" err="1">
-                <a:latin typeface="TH SarabunPSK" panose="020B0500040200020003" pitchFamily="34" charset="-34"/>
-                <a:cs typeface="TH SarabunPSK" panose="020B0500040200020003" pitchFamily="34" charset="-34"/>
-              </a:rPr>
-              <a:t>nametype</a:t>
-            </a:r>
-            <a:r>
-              <a:rPr lang="en-US" dirty="0" smtClean="0">
-                <a:latin typeface="TH SarabunPSK" panose="020B0500040200020003" pitchFamily="34" charset="-34"/>
-                <a:cs typeface="TH SarabunPSK" panose="020B0500040200020003" pitchFamily="34" charset="-34"/>
-              </a:rPr>
-              <a:t>) :</a:t>
+              <a:t>&gt; image</a:t>
+            </a:r>
+            <a:r>
+              <a:rPr lang="en-US" dirty="0" smtClean="0">
+                <a:latin typeface="TH SarabunPSK" panose="020B0500040200020003" pitchFamily="34" charset="-34"/>
+                <a:cs typeface="TH SarabunPSK" panose="020B0500040200020003" pitchFamily="34" charset="-34"/>
+              </a:rPr>
+              <a:t>) </a:t>
+            </a:r>
+            <a:r>
+              <a:rPr lang="en-US" dirty="0" smtClean="0">
+                <a:latin typeface="TH SarabunPSK" panose="020B0500040200020003" pitchFamily="34" charset="-34"/>
+                <a:cs typeface="TH SarabunPSK" panose="020B0500040200020003" pitchFamily="34" charset="-34"/>
+              </a:rPr>
+              <a:t>:</a:t>
             </a:r>
             <a:r>
               <a:rPr lang="en-US" dirty="0"/>
               <a:t> </a:t>
             </a:r>
             <a:r>
-              <a:rPr lang="en-US" dirty="0" smtClean="0">
+              <a:rPr lang="en-US" dirty="0">
                 <a:latin typeface="TH SarabunPSK" panose="020B0500040200020003" pitchFamily="34" charset="-34"/>
                 <a:cs typeface="TH SarabunPSK" panose="020B0500040200020003" pitchFamily="34" charset="-34"/>
               </a:rPr>
               <a:t>Image&lt;</a:t>
             </a:r>
             <a:r>
+              <a:rPr lang="en-US" dirty="0" err="1">
+                <a:latin typeface="TH SarabunPSK" panose="020B0500040200020003" pitchFamily="34" charset="-34"/>
+                <a:cs typeface="TH SarabunPSK" panose="020B0500040200020003" pitchFamily="34" charset="-34"/>
+              </a:rPr>
+              <a:t>Bgr</a:t>
+            </a:r>
+            <a:r>
+              <a:rPr lang="en-US" dirty="0">
+                <a:latin typeface="TH SarabunPSK" panose="020B0500040200020003" pitchFamily="34" charset="-34"/>
+                <a:cs typeface="TH SarabunPSK" panose="020B0500040200020003" pitchFamily="34" charset="-34"/>
+              </a:rPr>
+              <a:t>, byte&gt; </a:t>
+            </a:r>
+            <a:endParaRPr lang="en-US" dirty="0" smtClean="0">
+              <a:latin typeface="TH SarabunPSK" panose="020B0500040200020003" pitchFamily="34" charset="-34"/>
+              <a:cs typeface="TH SarabunPSK" panose="020B0500040200020003" pitchFamily="34" charset="-34"/>
+            </a:endParaRPr>
+          </a:p>
+          <a:p>
+            <a:r>
+              <a:rPr lang="en-US" dirty="0">
+                <a:latin typeface="TH SarabunPSK" panose="020B0500040200020003" pitchFamily="34" charset="-34"/>
+                <a:cs typeface="TH SarabunPSK" panose="020B0500040200020003" pitchFamily="34" charset="-34"/>
+              </a:rPr>
+              <a:t>-</a:t>
+            </a:r>
+            <a:r>
+              <a:rPr lang="en-US" dirty="0" smtClean="0">
+                <a:latin typeface="TH SarabunPSK" panose="020B0500040200020003" pitchFamily="34" charset="-34"/>
+                <a:cs typeface="TH SarabunPSK" panose="020B0500040200020003" pitchFamily="34" charset="-34"/>
+              </a:rPr>
+              <a:t> </a:t>
+            </a:r>
+            <a:r>
+              <a:rPr lang="en-US" dirty="0" err="1">
+                <a:latin typeface="TH SarabunPSK" panose="020B0500040200020003" pitchFamily="34" charset="-34"/>
+                <a:cs typeface="TH SarabunPSK" panose="020B0500040200020003" pitchFamily="34" charset="-34"/>
+              </a:rPr>
+              <a:t>HouCircles</a:t>
+            </a:r>
+            <a:r>
+              <a:rPr lang="en-US" dirty="0">
+                <a:latin typeface="TH SarabunPSK" panose="020B0500040200020003" pitchFamily="34" charset="-34"/>
+                <a:cs typeface="TH SarabunPSK" panose="020B0500040200020003" pitchFamily="34" charset="-34"/>
+              </a:rPr>
+              <a:t>(</a:t>
+            </a:r>
+            <a:r>
+              <a:rPr lang="en-US" dirty="0" err="1">
+                <a:latin typeface="TH SarabunPSK" panose="020B0500040200020003" pitchFamily="34" charset="-34"/>
+                <a:cs typeface="TH SarabunPSK" panose="020B0500040200020003" pitchFamily="34" charset="-34"/>
+              </a:rPr>
+              <a:t>HoughType</a:t>
+            </a:r>
+            <a:r>
+              <a:rPr lang="en-US" dirty="0">
+                <a:latin typeface="TH SarabunPSK" panose="020B0500040200020003" pitchFamily="34" charset="-34"/>
+                <a:cs typeface="TH SarabunPSK" panose="020B0500040200020003" pitchFamily="34" charset="-34"/>
+              </a:rPr>
+              <a:t> </a:t>
+            </a:r>
+            <a:r>
+              <a:rPr lang="en-US" dirty="0" err="1">
+                <a:latin typeface="TH SarabunPSK" panose="020B0500040200020003" pitchFamily="34" charset="-34"/>
+                <a:cs typeface="TH SarabunPSK" panose="020B0500040200020003" pitchFamily="34" charset="-34"/>
+              </a:rPr>
+              <a:t>method,double</a:t>
+            </a:r>
+            <a:r>
+              <a:rPr lang="en-US" dirty="0">
+                <a:latin typeface="TH SarabunPSK" panose="020B0500040200020003" pitchFamily="34" charset="-34"/>
+                <a:cs typeface="TH SarabunPSK" panose="020B0500040200020003" pitchFamily="34" charset="-34"/>
+              </a:rPr>
+              <a:t> </a:t>
+            </a:r>
+            <a:r>
+              <a:rPr lang="en-US" dirty="0" err="1">
+                <a:latin typeface="TH SarabunPSK" panose="020B0500040200020003" pitchFamily="34" charset="-34"/>
+                <a:cs typeface="TH SarabunPSK" panose="020B0500040200020003" pitchFamily="34" charset="-34"/>
+              </a:rPr>
+              <a:t>dp,double</a:t>
+            </a:r>
+            <a:r>
+              <a:rPr lang="en-US" dirty="0">
+                <a:latin typeface="TH SarabunPSK" panose="020B0500040200020003" pitchFamily="34" charset="-34"/>
+                <a:cs typeface="TH SarabunPSK" panose="020B0500040200020003" pitchFamily="34" charset="-34"/>
+              </a:rPr>
+              <a:t> </a:t>
+            </a:r>
+            <a:r>
+              <a:rPr lang="en-US" dirty="0" err="1">
+                <a:latin typeface="TH SarabunPSK" panose="020B0500040200020003" pitchFamily="34" charset="-34"/>
+                <a:cs typeface="TH SarabunPSK" panose="020B0500040200020003" pitchFamily="34" charset="-34"/>
+              </a:rPr>
+              <a:t>minDist,double</a:t>
+            </a:r>
+            <a:r>
+              <a:rPr lang="en-US" dirty="0">
+                <a:latin typeface="TH SarabunPSK" panose="020B0500040200020003" pitchFamily="34" charset="-34"/>
+                <a:cs typeface="TH SarabunPSK" panose="020B0500040200020003" pitchFamily="34" charset="-34"/>
+              </a:rPr>
+              <a:t> param1 = 100,double param2 = 100,int </a:t>
+            </a:r>
+            <a:r>
+              <a:rPr lang="en-US" dirty="0" err="1">
+                <a:latin typeface="TH SarabunPSK" panose="020B0500040200020003" pitchFamily="34" charset="-34"/>
+                <a:cs typeface="TH SarabunPSK" panose="020B0500040200020003" pitchFamily="34" charset="-34"/>
+              </a:rPr>
+              <a:t>minRadius</a:t>
+            </a:r>
+            <a:r>
+              <a:rPr lang="en-US" dirty="0">
+                <a:latin typeface="TH SarabunPSK" panose="020B0500040200020003" pitchFamily="34" charset="-34"/>
+                <a:cs typeface="TH SarabunPSK" panose="020B0500040200020003" pitchFamily="34" charset="-34"/>
+              </a:rPr>
+              <a:t> = 0,int </a:t>
+            </a:r>
+            <a:r>
+              <a:rPr lang="en-US" dirty="0" err="1">
+                <a:latin typeface="TH SarabunPSK" panose="020B0500040200020003" pitchFamily="34" charset="-34"/>
+                <a:cs typeface="TH SarabunPSK" panose="020B0500040200020003" pitchFamily="34" charset="-34"/>
+              </a:rPr>
+              <a:t>maxRadius</a:t>
+            </a:r>
+            <a:r>
+              <a:rPr lang="en-US" dirty="0">
+                <a:latin typeface="TH SarabunPSK" panose="020B0500040200020003" pitchFamily="34" charset="-34"/>
+                <a:cs typeface="TH SarabunPSK" panose="020B0500040200020003" pitchFamily="34" charset="-34"/>
+              </a:rPr>
+              <a:t> = 0</a:t>
+            </a:r>
+            <a:r>
+              <a:rPr lang="en-US" dirty="0" smtClean="0">
+                <a:latin typeface="TH SarabunPSK" panose="020B0500040200020003" pitchFamily="34" charset="-34"/>
+                <a:cs typeface="TH SarabunPSK" panose="020B0500040200020003" pitchFamily="34" charset="-34"/>
+              </a:rPr>
+              <a:t>) : Image&lt;</a:t>
+            </a:r>
+            <a:r>
               <a:rPr lang="en-US" dirty="0" err="1" smtClean="0">
                 <a:latin typeface="TH SarabunPSK" panose="020B0500040200020003" pitchFamily="34" charset="-34"/>
                 <a:cs typeface="TH SarabunPSK" panose="020B0500040200020003" pitchFamily="34" charset="-34"/>
               </a:rPr>
-              <a:t>Gray,byte</a:t>
+              <a:t>Bgr,byte</a:t>
             </a:r>
             <a:r>
               <a:rPr lang="en-US" dirty="0" smtClean="0">
@@ -8980,160 +9173,95 @@
               <a:t>+ </a:t>
             </a:r>
             <a:r>
+              <a:rPr lang="en-US" dirty="0" err="1" smtClean="0">
+                <a:latin typeface="TH SarabunPSK" panose="020B0500040200020003" pitchFamily="34" charset="-34"/>
+                <a:cs typeface="TH SarabunPSK" panose="020B0500040200020003" pitchFamily="34" charset="-34"/>
+              </a:rPr>
+              <a:t>SegmentionWatershed</a:t>
+            </a:r>
+            <a:r>
+              <a:rPr lang="en-US" dirty="0" smtClean="0">
+                <a:latin typeface="TH SarabunPSK" panose="020B0500040200020003" pitchFamily="34" charset="-34"/>
+                <a:cs typeface="TH SarabunPSK" panose="020B0500040200020003" pitchFamily="34" charset="-34"/>
+              </a:rPr>
+              <a:t>(</a:t>
+            </a:r>
+            <a:r>
               <a:rPr lang="en-US" dirty="0" err="1">
                 <a:latin typeface="TH SarabunPSK" panose="020B0500040200020003" pitchFamily="34" charset="-34"/>
                 <a:cs typeface="TH SarabunPSK" panose="020B0500040200020003" pitchFamily="34" charset="-34"/>
               </a:rPr>
-              <a:t>HouCircles</a:t>
+              <a:t>int</a:t>
             </a:r>
             <a:r>
               <a:rPr lang="en-US" dirty="0">
                 <a:latin typeface="TH SarabunPSK" panose="020B0500040200020003" pitchFamily="34" charset="-34"/>
                 <a:cs typeface="TH SarabunPSK" panose="020B0500040200020003" pitchFamily="34" charset="-34"/>
               </a:rPr>
-              <a:t>(</a:t>
+              <a:t> </a:t>
             </a:r>
             <a:r>
               <a:rPr lang="en-US" dirty="0" err="1">
                 <a:latin typeface="TH SarabunPSK" panose="020B0500040200020003" pitchFamily="34" charset="-34"/>
                 <a:cs typeface="TH SarabunPSK" panose="020B0500040200020003" pitchFamily="34" charset="-34"/>
               </a:rPr>
-              <a:t>HoughType</a:t>
+              <a:t>threshmin,bool</a:t>
             </a:r>
             <a:r>
               <a:rPr lang="en-US" dirty="0">
                 <a:latin typeface="TH SarabunPSK" panose="020B0500040200020003" pitchFamily="34" charset="-34"/>
                 <a:cs typeface="TH SarabunPSK" panose="020B0500040200020003" pitchFamily="34" charset="-34"/>
               </a:rPr>
-              <a:t> </a:t>
+              <a:t> flat</a:t>
+            </a:r>
+            <a:r>
+              <a:rPr lang="en-US" dirty="0" smtClean="0">
+                <a:latin typeface="TH SarabunPSK" panose="020B0500040200020003" pitchFamily="34" charset="-34"/>
+                <a:cs typeface="TH SarabunPSK" panose="020B0500040200020003" pitchFamily="34" charset="-34"/>
+              </a:rPr>
+              <a:t>) </a:t>
+            </a:r>
+            <a:r>
+              <a:rPr lang="en-US" dirty="0" smtClean="0">
+                <a:latin typeface="TH SarabunPSK" panose="020B0500040200020003" pitchFamily="34" charset="-34"/>
+                <a:cs typeface="TH SarabunPSK" panose="020B0500040200020003" pitchFamily="34" charset="-34"/>
+              </a:rPr>
+              <a:t>: </a:t>
+            </a:r>
+            <a:r>
+              <a:rPr lang="en-US" dirty="0">
+                <a:latin typeface="TH SarabunPSK" panose="020B0500040200020003" pitchFamily="34" charset="-34"/>
+                <a:cs typeface="TH SarabunPSK" panose="020B0500040200020003" pitchFamily="34" charset="-34"/>
+              </a:rPr>
+              <a:t>Tuple&lt;Image&lt;</a:t>
             </a:r>
             <a:r>
               <a:rPr lang="en-US" dirty="0" err="1">
                 <a:latin typeface="TH SarabunPSK" panose="020B0500040200020003" pitchFamily="34" charset="-34"/>
                 <a:cs typeface="TH SarabunPSK" panose="020B0500040200020003" pitchFamily="34" charset="-34"/>
               </a:rPr>
-              <a:t>method,double</a:t>
+              <a:t>Bgr,byte</a:t>
             </a:r>
             <a:r>
               <a:rPr lang="en-US" dirty="0">
                 <a:latin typeface="TH SarabunPSK" panose="020B0500040200020003" pitchFamily="34" charset="-34"/>
                 <a:cs typeface="TH SarabunPSK" panose="020B0500040200020003" pitchFamily="34" charset="-34"/>
               </a:rPr>
-              <a:t> </a:t>
+              <a:t>&gt;,</a:t>
             </a:r>
             <a:r>
               <a:rPr lang="en-US" dirty="0" err="1">
                 <a:latin typeface="TH SarabunPSK" panose="020B0500040200020003" pitchFamily="34" charset="-34"/>
                 <a:cs typeface="TH SarabunPSK" panose="020B0500040200020003" pitchFamily="34" charset="-34"/>
               </a:rPr>
-              <a:t>dp,double</a:t>
+              <a:t>int</a:t>
             </a:r>
             <a:r>
               <a:rPr lang="en-US" dirty="0">
                 <a:latin typeface="TH SarabunPSK" panose="020B0500040200020003" pitchFamily="34" charset="-34"/>
                 <a:cs typeface="TH SarabunPSK" panose="020B0500040200020003" pitchFamily="34" charset="-34"/>
               </a:rPr>
-              <a:t> </a:t>
-            </a:r>
-            <a:r>
-              <a:rPr lang="en-US" dirty="0" err="1">
-                <a:latin typeface="TH SarabunPSK" panose="020B0500040200020003" pitchFamily="34" charset="-34"/>
-                <a:cs typeface="TH SarabunPSK" panose="020B0500040200020003" pitchFamily="34" charset="-34"/>
-              </a:rPr>
-              <a:t>minDist,double</a:t>
-            </a:r>
-            <a:r>
-              <a:rPr lang="en-US" dirty="0">
-                <a:latin typeface="TH SarabunPSK" panose="020B0500040200020003" pitchFamily="34" charset="-34"/>
-                <a:cs typeface="TH SarabunPSK" panose="020B0500040200020003" pitchFamily="34" charset="-34"/>
-              </a:rPr>
-              <a:t> param1 = 100,double param2 = 100,int </a:t>
-            </a:r>
-            <a:r>
-              <a:rPr lang="en-US" dirty="0" err="1">
-                <a:latin typeface="TH SarabunPSK" panose="020B0500040200020003" pitchFamily="34" charset="-34"/>
-                <a:cs typeface="TH SarabunPSK" panose="020B0500040200020003" pitchFamily="34" charset="-34"/>
-              </a:rPr>
-              <a:t>minRadius</a:t>
-            </a:r>
-            <a:r>
-              <a:rPr lang="en-US" dirty="0">
-                <a:latin typeface="TH SarabunPSK" panose="020B0500040200020003" pitchFamily="34" charset="-34"/>
-                <a:cs typeface="TH SarabunPSK" panose="020B0500040200020003" pitchFamily="34" charset="-34"/>
-              </a:rPr>
-              <a:t> = 0,int </a:t>
-            </a:r>
-            <a:r>
-              <a:rPr lang="en-US" dirty="0" err="1">
-                <a:latin typeface="TH SarabunPSK" panose="020B0500040200020003" pitchFamily="34" charset="-34"/>
-                <a:cs typeface="TH SarabunPSK" panose="020B0500040200020003" pitchFamily="34" charset="-34"/>
-              </a:rPr>
-              <a:t>maxRadius</a:t>
-            </a:r>
-            <a:r>
-              <a:rPr lang="en-US" dirty="0">
-                <a:latin typeface="TH SarabunPSK" panose="020B0500040200020003" pitchFamily="34" charset="-34"/>
-                <a:cs typeface="TH SarabunPSK" panose="020B0500040200020003" pitchFamily="34" charset="-34"/>
-              </a:rPr>
-              <a:t> = 0</a:t>
-            </a:r>
-            <a:r>
-              <a:rPr lang="en-US" dirty="0" smtClean="0">
-                <a:latin typeface="TH SarabunPSK" panose="020B0500040200020003" pitchFamily="34" charset="-34"/>
-                <a:cs typeface="TH SarabunPSK" panose="020B0500040200020003" pitchFamily="34" charset="-34"/>
-              </a:rPr>
-              <a:t>) : Image&lt;</a:t>
-            </a:r>
-            <a:r>
-              <a:rPr lang="en-US" dirty="0" err="1" smtClean="0">
-                <a:latin typeface="TH SarabunPSK" panose="020B0500040200020003" pitchFamily="34" charset="-34"/>
-                <a:cs typeface="TH SarabunPSK" panose="020B0500040200020003" pitchFamily="34" charset="-34"/>
-              </a:rPr>
-              <a:t>Bgr,byte</a:t>
-            </a:r>
-            <a:r>
-              <a:rPr lang="en-US" dirty="0" smtClean="0">
-                <a:latin typeface="TH SarabunPSK" panose="020B0500040200020003" pitchFamily="34" charset="-34"/>
-                <a:cs typeface="TH SarabunPSK" panose="020B0500040200020003" pitchFamily="34" charset="-34"/>
-              </a:rPr>
               <a:t>&gt;</a:t>
-            </a:r>
-          </a:p>
-          <a:p>
-            <a:r>
-              <a:rPr lang="en-US" dirty="0" smtClean="0">
-                <a:latin typeface="TH SarabunPSK" panose="020B0500040200020003" pitchFamily="34" charset="-34"/>
-                <a:cs typeface="TH SarabunPSK" panose="020B0500040200020003" pitchFamily="34" charset="-34"/>
-              </a:rPr>
-              <a:t>+ Show_1(Image&lt;</a:t>
-            </a:r>
-            <a:r>
-              <a:rPr lang="en-US" dirty="0" err="1" smtClean="0">
-                <a:latin typeface="TH SarabunPSK" panose="020B0500040200020003" pitchFamily="34" charset="-34"/>
-                <a:cs typeface="TH SarabunPSK" panose="020B0500040200020003" pitchFamily="34" charset="-34"/>
-              </a:rPr>
-              <a:t>bgr</a:t>
-            </a:r>
-            <a:r>
-              <a:rPr lang="en-US" dirty="0" smtClean="0">
-                <a:latin typeface="TH SarabunPSK" panose="020B0500040200020003" pitchFamily="34" charset="-34"/>
-                <a:cs typeface="TH SarabunPSK" panose="020B0500040200020003" pitchFamily="34" charset="-34"/>
-              </a:rPr>
-              <a:t>, </a:t>
-            </a:r>
-            <a:r>
-              <a:rPr lang="en-US" dirty="0">
-                <a:latin typeface="TH SarabunPSK" panose="020B0500040200020003" pitchFamily="34" charset="-34"/>
-                <a:cs typeface="TH SarabunPSK" panose="020B0500040200020003" pitchFamily="34" charset="-34"/>
-              </a:rPr>
-              <a:t>byte&gt; image</a:t>
-            </a:r>
-            <a:r>
-              <a:rPr lang="en-US" dirty="0" smtClean="0">
-                <a:latin typeface="TH SarabunPSK" panose="020B0500040200020003" pitchFamily="34" charset="-34"/>
-                <a:cs typeface="TH SarabunPSK" panose="020B0500040200020003" pitchFamily="34" charset="-34"/>
-              </a:rPr>
-              <a:t>) : void</a:t>
             </a:r>
             <a:endParaRPr lang="en-US" dirty="0">
               <a:latin typeface="TH SarabunPSK" panose="020B0500040200020003" pitchFamily="34" charset="-34"/>
@@ -9149,6 +9277,1226 @@
               <a:latin typeface="TH SarabunPSK" panose="020B0500040200020003" pitchFamily="34" charset="-34"/>
               <a:cs typeface="TH SarabunPSK" panose="020B0500040200020003" pitchFamily="34" charset="-34"/>
             </a:endParaRPr>
+          </a:p>
+        </p:txBody>
+      </p:sp>
+      <p:sp>
+        <p:nvSpPr>
+          <p:cNvPr id="3" name="สี่เหลี่ยมผืนผ้า 2"/>
+          <p:cNvSpPr/>
+          <p:nvPr/>
+        </p:nvSpPr>
+        <p:spPr>
+          <a:xfrm>
+            <a:off x="7363838" y="587875"/>
+            <a:ext cx="3344802" cy="1432073"/>
+          </a:xfrm>
+          <a:prstGeom prst="rect">
+            <a:avLst/>
+          </a:prstGeom>
+          <a:noFill/>
+          <a:ln w="9525" cap="flat" cmpd="sng" algn="ctr">
+            <a:solidFill>
+              <a:schemeClr val="dk1"/>
+            </a:solidFill>
+            <a:prstDash val="solid"/>
+            <a:round/>
+            <a:headEnd type="none" w="med" len="med"/>
+            <a:tailEnd type="none" w="med" len="med"/>
+          </a:ln>
+        </p:spPr>
+        <p:style>
+          <a:lnRef idx="0">
+            <a:scrgbClr r="0" g="0" b="0"/>
+          </a:lnRef>
+          <a:fillRef idx="0">
+            <a:scrgbClr r="0" g="0" b="0"/>
+          </a:fillRef>
+          <a:effectRef idx="0">
+            <a:scrgbClr r="0" g="0" b="0"/>
+          </a:effectRef>
+          <a:fontRef idx="minor">
+            <a:schemeClr val="dk1"/>
+          </a:fontRef>
+        </p:style>
+        <p:txBody>
+          <a:bodyPr rtlCol="0" anchor="ctr"/>
+          <a:lstStyle/>
+          <a:p>
+            <a:pPr algn="ctr"/>
+            <a:endParaRPr lang="en-US"/>
+          </a:p>
+        </p:txBody>
+      </p:sp>
+      <p:sp>
+        <p:nvSpPr>
+          <p:cNvPr id="9" name="สี่เหลี่ยมผืนผ้า 8"/>
+          <p:cNvSpPr/>
+          <p:nvPr/>
+        </p:nvSpPr>
+        <p:spPr>
+          <a:xfrm>
+            <a:off x="7363839" y="587876"/>
+            <a:ext cx="3344801" cy="452984"/>
+          </a:xfrm>
+          <a:prstGeom prst="rect">
+            <a:avLst/>
+          </a:prstGeom>
+          <a:noFill/>
+          <a:ln w="9525" cap="flat" cmpd="sng" algn="ctr">
+            <a:solidFill>
+              <a:schemeClr val="dk1"/>
+            </a:solidFill>
+            <a:prstDash val="solid"/>
+            <a:round/>
+            <a:headEnd type="none" w="med" len="med"/>
+            <a:tailEnd type="none" w="med" len="med"/>
+          </a:ln>
+        </p:spPr>
+        <p:style>
+          <a:lnRef idx="0">
+            <a:scrgbClr r="0" g="0" b="0"/>
+          </a:lnRef>
+          <a:fillRef idx="0">
+            <a:scrgbClr r="0" g="0" b="0"/>
+          </a:fillRef>
+          <a:effectRef idx="0">
+            <a:scrgbClr r="0" g="0" b="0"/>
+          </a:effectRef>
+          <a:fontRef idx="minor">
+            <a:schemeClr val="dk1"/>
+          </a:fontRef>
+        </p:style>
+        <p:txBody>
+          <a:bodyPr rtlCol="0" anchor="ctr"/>
+          <a:lstStyle/>
+          <a:p>
+            <a:pPr algn="ctr"/>
+            <a:endParaRPr lang="en-US"/>
+          </a:p>
+        </p:txBody>
+      </p:sp>
+      <p:cxnSp>
+        <p:nvCxnSpPr>
+          <p:cNvPr id="13" name="ตัวเชื่อมต่อหักมุม 12"/>
+          <p:cNvCxnSpPr/>
+          <p:nvPr/>
+        </p:nvCxnSpPr>
+        <p:spPr>
+          <a:xfrm flipV="1">
+            <a:off x="6388014" y="1303912"/>
+            <a:ext cx="975824" cy="1862377"/>
+          </a:xfrm>
+          <a:prstGeom prst="bentConnector3">
+            <a:avLst>
+              <a:gd name="adj1" fmla="val 51041"/>
+            </a:avLst>
+          </a:prstGeom>
+        </p:spPr>
+        <p:style>
+          <a:lnRef idx="1">
+            <a:schemeClr val="dk1"/>
+          </a:lnRef>
+          <a:fillRef idx="0">
+            <a:schemeClr val="dk1"/>
+          </a:fillRef>
+          <a:effectRef idx="0">
+            <a:schemeClr val="dk1"/>
+          </a:effectRef>
+          <a:fontRef idx="minor">
+            <a:schemeClr val="tx1"/>
+          </a:fontRef>
+        </p:style>
+      </p:cxnSp>
+      <p:sp>
+        <p:nvSpPr>
+          <p:cNvPr id="14" name="เครื่องหมายบั้ง 13"/>
+          <p:cNvSpPr/>
+          <p:nvPr/>
+        </p:nvSpPr>
+        <p:spPr>
+          <a:xfrm>
+            <a:off x="7233770" y="1249922"/>
+            <a:ext cx="116732" cy="107977"/>
+          </a:xfrm>
+          <a:prstGeom prst="chevron">
+            <a:avLst/>
+          </a:prstGeom>
+          <a:solidFill>
+            <a:schemeClr val="bg1"/>
+          </a:solidFill>
+          <a:ln>
+            <a:solidFill>
+              <a:schemeClr val="tx1"/>
+            </a:solidFill>
+          </a:ln>
+        </p:spPr>
+        <p:style>
+          <a:lnRef idx="2">
+            <a:schemeClr val="accent1">
+              <a:shade val="50000"/>
+            </a:schemeClr>
+          </a:lnRef>
+          <a:fillRef idx="1">
+            <a:schemeClr val="accent1"/>
+          </a:fillRef>
+          <a:effectRef idx="0">
+            <a:schemeClr val="accent1"/>
+          </a:effectRef>
+          <a:fontRef idx="minor">
+            <a:schemeClr val="lt1"/>
+          </a:fontRef>
+        </p:style>
+        <p:txBody>
+          <a:bodyPr rtlCol="0" anchor="ctr"/>
+          <a:lstStyle/>
+          <a:p>
+            <a:pPr algn="ctr"/>
+            <a:endParaRPr lang="en-US">
+              <a:solidFill>
+                <a:schemeClr val="tx1"/>
+              </a:solidFill>
+            </a:endParaRPr>
+          </a:p>
+        </p:txBody>
+      </p:sp>
+      <p:sp>
+        <p:nvSpPr>
+          <p:cNvPr id="15" name="กล่องข้อความ 14"/>
+          <p:cNvSpPr txBox="1"/>
+          <p:nvPr/>
+        </p:nvSpPr>
+        <p:spPr>
+          <a:xfrm>
+            <a:off x="7468550" y="629702"/>
+            <a:ext cx="3240090" cy="369332"/>
+          </a:xfrm>
+          <a:prstGeom prst="rect">
+            <a:avLst/>
+          </a:prstGeom>
+          <a:noFill/>
+        </p:spPr>
+        <p:txBody>
+          <a:bodyPr wrap="square" rtlCol="0">
+            <a:spAutoFit/>
+          </a:bodyPr>
+          <a:lstStyle/>
+          <a:p>
+            <a:pPr algn="ctr"/>
+            <a:r>
+              <a:rPr lang="en-US" dirty="0" err="1">
+                <a:latin typeface="TH SarabunPSK" panose="020B0500040200020003" pitchFamily="34" charset="-34"/>
+                <a:cs typeface="TH SarabunPSK" panose="020B0500040200020003" pitchFamily="34" charset="-34"/>
+              </a:rPr>
+              <a:t>MethodTranfrom</a:t>
+            </a:r>
+            <a:endParaRPr lang="en-US" dirty="0">
+              <a:latin typeface="TH SarabunPSK" panose="020B0500040200020003" pitchFamily="34" charset="-34"/>
+              <a:cs typeface="TH SarabunPSK" panose="020B0500040200020003" pitchFamily="34" charset="-34"/>
+            </a:endParaRPr>
+          </a:p>
+        </p:txBody>
+      </p:sp>
+      <p:sp>
+        <p:nvSpPr>
+          <p:cNvPr id="16" name="กล่องข้อความ 15"/>
+          <p:cNvSpPr txBox="1"/>
+          <p:nvPr/>
+        </p:nvSpPr>
+        <p:spPr>
+          <a:xfrm>
+            <a:off x="7363838" y="1040860"/>
+            <a:ext cx="3344802" cy="400110"/>
+          </a:xfrm>
+          <a:prstGeom prst="rect">
+            <a:avLst/>
+          </a:prstGeom>
+          <a:noFill/>
+          <a:ln w="9525" cap="flat" cmpd="sng" algn="ctr">
+            <a:solidFill>
+              <a:schemeClr val="dk1"/>
+            </a:solidFill>
+            <a:prstDash val="solid"/>
+            <a:round/>
+            <a:headEnd type="none" w="med" len="med"/>
+            <a:tailEnd type="none" w="med" len="med"/>
+          </a:ln>
+        </p:spPr>
+        <p:style>
+          <a:lnRef idx="0">
+            <a:scrgbClr r="0" g="0" b="0"/>
+          </a:lnRef>
+          <a:fillRef idx="0">
+            <a:scrgbClr r="0" g="0" b="0"/>
+          </a:fillRef>
+          <a:effectRef idx="0">
+            <a:scrgbClr r="0" g="0" b="0"/>
+          </a:effectRef>
+          <a:fontRef idx="minor">
+            <a:schemeClr val="dk1"/>
+          </a:fontRef>
+        </p:style>
+        <p:txBody>
+          <a:bodyPr wrap="square" rtlCol="0">
+            <a:spAutoFit/>
+          </a:bodyPr>
+          <a:lstStyle/>
+          <a:p>
+            <a:r>
+              <a:rPr lang="en-US" sz="2000" dirty="0" smtClean="0">
+                <a:latin typeface="TH SarabunPSK" panose="020B0500040200020003" pitchFamily="34" charset="-34"/>
+                <a:cs typeface="TH SarabunPSK" panose="020B0500040200020003" pitchFamily="34" charset="-34"/>
+              </a:rPr>
+              <a:t>- Image </a:t>
+            </a:r>
+            <a:r>
+              <a:rPr lang="en-US" sz="2000" dirty="0">
+                <a:latin typeface="TH SarabunPSK" panose="020B0500040200020003" pitchFamily="34" charset="-34"/>
+                <a:cs typeface="TH SarabunPSK" panose="020B0500040200020003" pitchFamily="34" charset="-34"/>
+              </a:rPr>
+              <a:t>Matrix&lt;</a:t>
+            </a:r>
+            <a:r>
+              <a:rPr lang="en-US" sz="2000" dirty="0" err="1">
+                <a:latin typeface="TH SarabunPSK" panose="020B0500040200020003" pitchFamily="34" charset="-34"/>
+                <a:cs typeface="TH SarabunPSK" panose="020B0500040200020003" pitchFamily="34" charset="-34"/>
+              </a:rPr>
+              <a:t>ushort</a:t>
+            </a:r>
+            <a:r>
+              <a:rPr lang="en-US" sz="2000" dirty="0">
+                <a:latin typeface="TH SarabunPSK" panose="020B0500040200020003" pitchFamily="34" charset="-34"/>
+                <a:cs typeface="TH SarabunPSK" panose="020B0500040200020003" pitchFamily="34" charset="-34"/>
+              </a:rPr>
+              <a:t>&gt; </a:t>
+            </a:r>
+            <a:r>
+              <a:rPr lang="en-US" sz="2000" dirty="0" smtClean="0">
+                <a:latin typeface="TH SarabunPSK" panose="020B0500040200020003" pitchFamily="34" charset="-34"/>
+                <a:cs typeface="TH SarabunPSK" panose="020B0500040200020003" pitchFamily="34" charset="-34"/>
+              </a:rPr>
+              <a:t>;</a:t>
+            </a:r>
+            <a:endParaRPr lang="en-US" sz="2000" dirty="0">
+              <a:latin typeface="TH SarabunPSK" panose="020B0500040200020003" pitchFamily="34" charset="-34"/>
+              <a:cs typeface="TH SarabunPSK" panose="020B0500040200020003" pitchFamily="34" charset="-34"/>
+            </a:endParaRPr>
+          </a:p>
+        </p:txBody>
+      </p:sp>
+      <p:sp>
+        <p:nvSpPr>
+          <p:cNvPr id="18" name="กล่องข้อความ 17"/>
+          <p:cNvSpPr txBox="1"/>
+          <p:nvPr/>
+        </p:nvSpPr>
+        <p:spPr>
+          <a:xfrm>
+            <a:off x="7363838" y="1410192"/>
+            <a:ext cx="4357622" cy="707886"/>
+          </a:xfrm>
+          <a:prstGeom prst="rect">
+            <a:avLst/>
+          </a:prstGeom>
+          <a:noFill/>
+        </p:spPr>
+        <p:txBody>
+          <a:bodyPr wrap="square" rtlCol="0">
+            <a:spAutoFit/>
+          </a:bodyPr>
+          <a:lstStyle/>
+          <a:p>
+            <a:r>
+              <a:rPr lang="en-US" sz="2000" dirty="0" smtClean="0">
+                <a:latin typeface="TH SarabunPSK" panose="020B0500040200020003" pitchFamily="34" charset="-34"/>
+                <a:cs typeface="TH SarabunPSK" panose="020B0500040200020003" pitchFamily="34" charset="-34"/>
+              </a:rPr>
+              <a:t>+ </a:t>
+            </a:r>
+            <a:r>
+              <a:rPr lang="en-US" sz="2000" dirty="0" err="1" smtClean="0">
+                <a:latin typeface="TH SarabunPSK" panose="020B0500040200020003" pitchFamily="34" charset="-34"/>
+                <a:cs typeface="TH SarabunPSK" panose="020B0500040200020003" pitchFamily="34" charset="-34"/>
+              </a:rPr>
+              <a:t>GetRaw</a:t>
+            </a:r>
+            <a:r>
+              <a:rPr lang="en-US" sz="2000" dirty="0" smtClean="0">
+                <a:latin typeface="TH SarabunPSK" panose="020B0500040200020003" pitchFamily="34" charset="-34"/>
+                <a:cs typeface="TH SarabunPSK" panose="020B0500040200020003" pitchFamily="34" charset="-34"/>
+              </a:rPr>
+              <a:t>()</a:t>
+            </a:r>
+            <a:r>
+              <a:rPr lang="en-US" sz="2000" dirty="0">
+                <a:latin typeface="TH SarabunPSK" panose="020B0500040200020003" pitchFamily="34" charset="-34"/>
+                <a:cs typeface="TH SarabunPSK" panose="020B0500040200020003" pitchFamily="34" charset="-34"/>
+              </a:rPr>
+              <a:t> </a:t>
+            </a:r>
+            <a:r>
+              <a:rPr lang="en-US" sz="2000" dirty="0" smtClean="0">
+                <a:latin typeface="TH SarabunPSK" panose="020B0500040200020003" pitchFamily="34" charset="-34"/>
+                <a:cs typeface="TH SarabunPSK" panose="020B0500040200020003" pitchFamily="34" charset="-34"/>
+              </a:rPr>
+              <a:t>: Matrix&lt;</a:t>
+            </a:r>
+            <a:r>
+              <a:rPr lang="en-US" sz="2000" dirty="0" err="1" smtClean="0">
+                <a:latin typeface="TH SarabunPSK" panose="020B0500040200020003" pitchFamily="34" charset="-34"/>
+                <a:cs typeface="TH SarabunPSK" panose="020B0500040200020003" pitchFamily="34" charset="-34"/>
+              </a:rPr>
+              <a:t>ushort</a:t>
+            </a:r>
+            <a:r>
+              <a:rPr lang="en-US" sz="2000" dirty="0">
+                <a:latin typeface="TH SarabunPSK" panose="020B0500040200020003" pitchFamily="34" charset="-34"/>
+                <a:cs typeface="TH SarabunPSK" panose="020B0500040200020003" pitchFamily="34" charset="-34"/>
+              </a:rPr>
+              <a:t>&gt; </a:t>
+            </a:r>
+            <a:endParaRPr lang="en-US" sz="2000" dirty="0" smtClean="0">
+              <a:latin typeface="TH SarabunPSK" panose="020B0500040200020003" pitchFamily="34" charset="-34"/>
+              <a:cs typeface="TH SarabunPSK" panose="020B0500040200020003" pitchFamily="34" charset="-34"/>
+            </a:endParaRPr>
+          </a:p>
+          <a:p>
+            <a:r>
+              <a:rPr lang="en-US" dirty="0" smtClean="0">
+                <a:latin typeface="TH SarabunPSK" panose="020B0500040200020003" pitchFamily="34" charset="-34"/>
+                <a:cs typeface="TH SarabunPSK" panose="020B0500040200020003" pitchFamily="34" charset="-34"/>
+              </a:rPr>
+              <a:t>+ Convert1628() :</a:t>
+            </a:r>
+            <a:r>
+              <a:rPr lang="en-US" sz="2000" dirty="0">
+                <a:latin typeface="TH SarabunPSK" panose="020B0500040200020003" pitchFamily="34" charset="-34"/>
+                <a:cs typeface="TH SarabunPSK" panose="020B0500040200020003" pitchFamily="34" charset="-34"/>
+              </a:rPr>
+              <a:t> Matrix&lt;</a:t>
+            </a:r>
+            <a:r>
+              <a:rPr lang="en-US" sz="2000" dirty="0" err="1">
+                <a:latin typeface="TH SarabunPSK" panose="020B0500040200020003" pitchFamily="34" charset="-34"/>
+                <a:cs typeface="TH SarabunPSK" panose="020B0500040200020003" pitchFamily="34" charset="-34"/>
+              </a:rPr>
+              <a:t>ushort</a:t>
+            </a:r>
+            <a:r>
+              <a:rPr lang="en-US" sz="2000" dirty="0">
+                <a:latin typeface="TH SarabunPSK" panose="020B0500040200020003" pitchFamily="34" charset="-34"/>
+                <a:cs typeface="TH SarabunPSK" panose="020B0500040200020003" pitchFamily="34" charset="-34"/>
+              </a:rPr>
+              <a:t>&gt; </a:t>
+            </a:r>
+          </a:p>
+        </p:txBody>
+      </p:sp>
+      <p:sp>
+        <p:nvSpPr>
+          <p:cNvPr id="22" name="สี่เหลี่ยมผืนผ้า 21"/>
+          <p:cNvSpPr/>
+          <p:nvPr/>
+        </p:nvSpPr>
+        <p:spPr>
+          <a:xfrm>
+            <a:off x="7363838" y="2709039"/>
+            <a:ext cx="3344802" cy="834481"/>
+          </a:xfrm>
+          <a:prstGeom prst="rect">
+            <a:avLst/>
+          </a:prstGeom>
+          <a:noFill/>
+          <a:ln w="9525" cap="flat" cmpd="sng" algn="ctr">
+            <a:solidFill>
+              <a:schemeClr val="dk1"/>
+            </a:solidFill>
+            <a:prstDash val="solid"/>
+            <a:round/>
+            <a:headEnd type="none" w="med" len="med"/>
+            <a:tailEnd type="none" w="med" len="med"/>
+          </a:ln>
+        </p:spPr>
+        <p:style>
+          <a:lnRef idx="0">
+            <a:scrgbClr r="0" g="0" b="0"/>
+          </a:lnRef>
+          <a:fillRef idx="0">
+            <a:scrgbClr r="0" g="0" b="0"/>
+          </a:fillRef>
+          <a:effectRef idx="0">
+            <a:scrgbClr r="0" g="0" b="0"/>
+          </a:effectRef>
+          <a:fontRef idx="minor">
+            <a:schemeClr val="dk1"/>
+          </a:fontRef>
+        </p:style>
+        <p:txBody>
+          <a:bodyPr rtlCol="0" anchor="ctr"/>
+          <a:lstStyle/>
+          <a:p>
+            <a:pPr algn="ctr"/>
+            <a:endParaRPr lang="en-US"/>
+          </a:p>
+        </p:txBody>
+      </p:sp>
+      <p:sp>
+        <p:nvSpPr>
+          <p:cNvPr id="23" name="สี่เหลี่ยมผืนผ้า 22"/>
+          <p:cNvSpPr/>
+          <p:nvPr/>
+        </p:nvSpPr>
+        <p:spPr>
+          <a:xfrm>
+            <a:off x="7363839" y="2709040"/>
+            <a:ext cx="3344801" cy="452984"/>
+          </a:xfrm>
+          <a:prstGeom prst="rect">
+            <a:avLst/>
+          </a:prstGeom>
+          <a:noFill/>
+          <a:ln w="9525" cap="flat" cmpd="sng" algn="ctr">
+            <a:solidFill>
+              <a:schemeClr val="dk1"/>
+            </a:solidFill>
+            <a:prstDash val="solid"/>
+            <a:round/>
+            <a:headEnd type="none" w="med" len="med"/>
+            <a:tailEnd type="none" w="med" len="med"/>
+          </a:ln>
+        </p:spPr>
+        <p:style>
+          <a:lnRef idx="0">
+            <a:scrgbClr r="0" g="0" b="0"/>
+          </a:lnRef>
+          <a:fillRef idx="0">
+            <a:scrgbClr r="0" g="0" b="0"/>
+          </a:fillRef>
+          <a:effectRef idx="0">
+            <a:scrgbClr r="0" g="0" b="0"/>
+          </a:effectRef>
+          <a:fontRef idx="minor">
+            <a:schemeClr val="dk1"/>
+          </a:fontRef>
+        </p:style>
+        <p:txBody>
+          <a:bodyPr rtlCol="0" anchor="ctr"/>
+          <a:lstStyle/>
+          <a:p>
+            <a:pPr algn="ctr"/>
+            <a:endParaRPr lang="en-US"/>
+          </a:p>
+        </p:txBody>
+      </p:sp>
+      <p:sp>
+        <p:nvSpPr>
+          <p:cNvPr id="25" name="กล่องข้อความ 24"/>
+          <p:cNvSpPr txBox="1"/>
+          <p:nvPr/>
+        </p:nvSpPr>
+        <p:spPr>
+          <a:xfrm>
+            <a:off x="7468550" y="2750866"/>
+            <a:ext cx="3240090" cy="369332"/>
+          </a:xfrm>
+          <a:prstGeom prst="rect">
+            <a:avLst/>
+          </a:prstGeom>
+          <a:noFill/>
+        </p:spPr>
+        <p:txBody>
+          <a:bodyPr wrap="square" rtlCol="0">
+            <a:spAutoFit/>
+          </a:bodyPr>
+          <a:lstStyle/>
+          <a:p>
+            <a:pPr algn="ctr"/>
+            <a:r>
+              <a:rPr lang="en-US" dirty="0" err="1">
+                <a:latin typeface="TH SarabunPSK" panose="020B0500040200020003" pitchFamily="34" charset="-34"/>
+                <a:cs typeface="TH SarabunPSK" panose="020B0500040200020003" pitchFamily="34" charset="-34"/>
+              </a:rPr>
+              <a:t>MethodStaticFomula</a:t>
+            </a:r>
+            <a:endParaRPr lang="en-US" dirty="0">
+              <a:latin typeface="TH SarabunPSK" panose="020B0500040200020003" pitchFamily="34" charset="-34"/>
+              <a:cs typeface="TH SarabunPSK" panose="020B0500040200020003" pitchFamily="34" charset="-34"/>
+            </a:endParaRPr>
+          </a:p>
+        </p:txBody>
+      </p:sp>
+      <p:sp>
+        <p:nvSpPr>
+          <p:cNvPr id="30" name="กล่องข้อความ 29"/>
+          <p:cNvSpPr txBox="1"/>
+          <p:nvPr/>
+        </p:nvSpPr>
+        <p:spPr>
+          <a:xfrm>
+            <a:off x="7363838" y="3120198"/>
+            <a:ext cx="3371475" cy="369332"/>
+          </a:xfrm>
+          <a:prstGeom prst="rect">
+            <a:avLst/>
+          </a:prstGeom>
+          <a:noFill/>
+        </p:spPr>
+        <p:txBody>
+          <a:bodyPr wrap="square" rtlCol="0">
+            <a:spAutoFit/>
+          </a:bodyPr>
+          <a:lstStyle/>
+          <a:p>
+            <a:r>
+              <a:rPr lang="en-US" dirty="0" smtClean="0">
+                <a:latin typeface="TH SarabunPSK" panose="020B0500040200020003" pitchFamily="34" charset="-34"/>
+                <a:cs typeface="TH SarabunPSK" panose="020B0500040200020003" pitchFamily="34" charset="-34"/>
+              </a:rPr>
+              <a:t>+ </a:t>
+            </a:r>
+            <a:r>
+              <a:rPr lang="en-US" dirty="0" err="1" smtClean="0">
+                <a:latin typeface="TH SarabunPSK" panose="020B0500040200020003" pitchFamily="34" charset="-34"/>
+                <a:cs typeface="TH SarabunPSK" panose="020B0500040200020003" pitchFamily="34" charset="-34"/>
+              </a:rPr>
+              <a:t>CenterOfCircle</a:t>
+            </a:r>
+            <a:r>
+              <a:rPr lang="en-US" dirty="0" smtClean="0">
+                <a:latin typeface="TH SarabunPSK" panose="020B0500040200020003" pitchFamily="34" charset="-34"/>
+                <a:cs typeface="TH SarabunPSK" panose="020B0500040200020003" pitchFamily="34" charset="-34"/>
+              </a:rPr>
+              <a:t>(</a:t>
+            </a:r>
+            <a:r>
+              <a:rPr lang="en-US" dirty="0">
+                <a:latin typeface="TH SarabunPSK" panose="020B0500040200020003" pitchFamily="34" charset="-34"/>
+                <a:cs typeface="TH SarabunPSK" panose="020B0500040200020003" pitchFamily="34" charset="-34"/>
+              </a:rPr>
+              <a:t>Rectangle </a:t>
+            </a:r>
+            <a:r>
+              <a:rPr lang="en-US" dirty="0" err="1">
+                <a:latin typeface="TH SarabunPSK" panose="020B0500040200020003" pitchFamily="34" charset="-34"/>
+                <a:cs typeface="TH SarabunPSK" panose="020B0500040200020003" pitchFamily="34" charset="-34"/>
+              </a:rPr>
+              <a:t>rect</a:t>
+            </a:r>
+            <a:r>
+              <a:rPr lang="en-US" dirty="0" smtClean="0">
+                <a:latin typeface="TH SarabunPSK" panose="020B0500040200020003" pitchFamily="34" charset="-34"/>
+                <a:cs typeface="TH SarabunPSK" panose="020B0500040200020003" pitchFamily="34" charset="-34"/>
+              </a:rPr>
+              <a:t>) </a:t>
+            </a:r>
+            <a:r>
+              <a:rPr lang="en-US" dirty="0">
+                <a:latin typeface="TH SarabunPSK" panose="020B0500040200020003" pitchFamily="34" charset="-34"/>
+                <a:cs typeface="TH SarabunPSK" panose="020B0500040200020003" pitchFamily="34" charset="-34"/>
+              </a:rPr>
+              <a:t>Point</a:t>
+            </a:r>
+            <a:endParaRPr lang="en-US" dirty="0">
+              <a:latin typeface="TH SarabunPSK" panose="020B0500040200020003" pitchFamily="34" charset="-34"/>
+              <a:cs typeface="TH SarabunPSK" panose="020B0500040200020003" pitchFamily="34" charset="-34"/>
+            </a:endParaRPr>
+          </a:p>
+        </p:txBody>
+      </p:sp>
+      <p:sp>
+        <p:nvSpPr>
+          <p:cNvPr id="37" name="สี่เหลี่ยมผืนผ้า 36"/>
+          <p:cNvSpPr/>
+          <p:nvPr/>
+        </p:nvSpPr>
+        <p:spPr>
+          <a:xfrm>
+            <a:off x="7363839" y="3858861"/>
+            <a:ext cx="4157538" cy="2734979"/>
+          </a:xfrm>
+          <a:prstGeom prst="rect">
+            <a:avLst/>
+          </a:prstGeom>
+          <a:noFill/>
+          <a:ln w="9525" cap="flat" cmpd="sng" algn="ctr">
+            <a:solidFill>
+              <a:schemeClr val="dk1"/>
+            </a:solidFill>
+            <a:prstDash val="solid"/>
+            <a:round/>
+            <a:headEnd type="none" w="med" len="med"/>
+            <a:tailEnd type="none" w="med" len="med"/>
+          </a:ln>
+        </p:spPr>
+        <p:style>
+          <a:lnRef idx="0">
+            <a:scrgbClr r="0" g="0" b="0"/>
+          </a:lnRef>
+          <a:fillRef idx="0">
+            <a:scrgbClr r="0" g="0" b="0"/>
+          </a:fillRef>
+          <a:effectRef idx="0">
+            <a:scrgbClr r="0" g="0" b="0"/>
+          </a:effectRef>
+          <a:fontRef idx="minor">
+            <a:schemeClr val="dk1"/>
+          </a:fontRef>
+        </p:style>
+        <p:txBody>
+          <a:bodyPr rtlCol="0" anchor="ctr"/>
+          <a:lstStyle/>
+          <a:p>
+            <a:pPr algn="ctr"/>
+            <a:endParaRPr lang="en-US"/>
+          </a:p>
+        </p:txBody>
+      </p:sp>
+      <p:sp>
+        <p:nvSpPr>
+          <p:cNvPr id="38" name="สี่เหลี่ยมผืนผ้า 37"/>
+          <p:cNvSpPr/>
+          <p:nvPr/>
+        </p:nvSpPr>
+        <p:spPr>
+          <a:xfrm>
+            <a:off x="7363840" y="3858862"/>
+            <a:ext cx="4157537" cy="452984"/>
+          </a:xfrm>
+          <a:prstGeom prst="rect">
+            <a:avLst/>
+          </a:prstGeom>
+          <a:noFill/>
+          <a:ln w="9525" cap="flat" cmpd="sng" algn="ctr">
+            <a:solidFill>
+              <a:schemeClr val="dk1"/>
+            </a:solidFill>
+            <a:prstDash val="solid"/>
+            <a:round/>
+            <a:headEnd type="none" w="med" len="med"/>
+            <a:tailEnd type="none" w="med" len="med"/>
+          </a:ln>
+        </p:spPr>
+        <p:style>
+          <a:lnRef idx="0">
+            <a:scrgbClr r="0" g="0" b="0"/>
+          </a:lnRef>
+          <a:fillRef idx="0">
+            <a:scrgbClr r="0" g="0" b="0"/>
+          </a:fillRef>
+          <a:effectRef idx="0">
+            <a:scrgbClr r="0" g="0" b="0"/>
+          </a:effectRef>
+          <a:fontRef idx="minor">
+            <a:schemeClr val="dk1"/>
+          </a:fontRef>
+        </p:style>
+        <p:txBody>
+          <a:bodyPr rtlCol="0" anchor="ctr"/>
+          <a:lstStyle/>
+          <a:p>
+            <a:pPr algn="ctr"/>
+            <a:endParaRPr lang="en-US"/>
+          </a:p>
+        </p:txBody>
+      </p:sp>
+      <p:sp>
+        <p:nvSpPr>
+          <p:cNvPr id="40" name="กล่องข้อความ 39"/>
+          <p:cNvSpPr txBox="1"/>
+          <p:nvPr/>
+        </p:nvSpPr>
+        <p:spPr>
+          <a:xfrm>
+            <a:off x="7468551" y="3900688"/>
+            <a:ext cx="4052826" cy="369332"/>
+          </a:xfrm>
+          <a:prstGeom prst="rect">
+            <a:avLst/>
+          </a:prstGeom>
+          <a:noFill/>
+        </p:spPr>
+        <p:txBody>
+          <a:bodyPr wrap="square" rtlCol="0">
+            <a:spAutoFit/>
+          </a:bodyPr>
+          <a:lstStyle/>
+          <a:p>
+            <a:pPr algn="ctr"/>
+            <a:r>
+              <a:rPr lang="en-US" dirty="0" err="1"/>
+              <a:t>FitsFile</a:t>
+            </a:r>
+            <a:endParaRPr lang="en-US" dirty="0">
+              <a:latin typeface="TH SarabunPSK" panose="020B0500040200020003" pitchFamily="34" charset="-34"/>
+              <a:cs typeface="TH SarabunPSK" panose="020B0500040200020003" pitchFamily="34" charset="-34"/>
+            </a:endParaRPr>
+          </a:p>
+        </p:txBody>
+      </p:sp>
+      <p:sp>
+        <p:nvSpPr>
+          <p:cNvPr id="46" name="กล่องข้อความ 45"/>
+          <p:cNvSpPr txBox="1"/>
+          <p:nvPr/>
+        </p:nvSpPr>
+        <p:spPr>
+          <a:xfrm>
+            <a:off x="7347872" y="4260744"/>
+            <a:ext cx="4157539" cy="2308324"/>
+          </a:xfrm>
+          <a:prstGeom prst="rect">
+            <a:avLst/>
+          </a:prstGeom>
+          <a:noFill/>
+        </p:spPr>
+        <p:txBody>
+          <a:bodyPr wrap="square" rtlCol="0">
+            <a:spAutoFit/>
+          </a:bodyPr>
+          <a:lstStyle/>
+          <a:p>
+            <a:r>
+              <a:rPr lang="en-US" dirty="0" smtClean="0">
+                <a:latin typeface="TH SarabunPSK" panose="020B0500040200020003" pitchFamily="34" charset="-34"/>
+                <a:cs typeface="TH SarabunPSK" panose="020B0500040200020003" pitchFamily="34" charset="-34"/>
+              </a:rPr>
+              <a:t>+ </a:t>
+            </a:r>
+            <a:r>
+              <a:rPr lang="en-US" dirty="0" err="1" smtClean="0">
+                <a:latin typeface="TH SarabunPSK" panose="020B0500040200020003" pitchFamily="34" charset="-34"/>
+                <a:cs typeface="TH SarabunPSK" panose="020B0500040200020003" pitchFamily="34" charset="-34"/>
+              </a:rPr>
+              <a:t>GenerateImage</a:t>
+            </a:r>
+            <a:r>
+              <a:rPr lang="en-US" dirty="0" smtClean="0">
+                <a:latin typeface="TH SarabunPSK" panose="020B0500040200020003" pitchFamily="34" charset="-34"/>
+                <a:cs typeface="TH SarabunPSK" panose="020B0500040200020003" pitchFamily="34" charset="-34"/>
+              </a:rPr>
+              <a:t>(string </a:t>
+            </a:r>
+            <a:r>
+              <a:rPr lang="en-US" dirty="0" err="1">
+                <a:latin typeface="TH SarabunPSK" panose="020B0500040200020003" pitchFamily="34" charset="-34"/>
+                <a:cs typeface="TH SarabunPSK" panose="020B0500040200020003" pitchFamily="34" charset="-34"/>
+              </a:rPr>
+              <a:t>pathfitsfile</a:t>
+            </a:r>
+            <a:r>
+              <a:rPr lang="en-US" dirty="0" smtClean="0">
+                <a:latin typeface="TH SarabunPSK" panose="020B0500040200020003" pitchFamily="34" charset="-34"/>
+                <a:cs typeface="TH SarabunPSK" panose="020B0500040200020003" pitchFamily="34" charset="-34"/>
+              </a:rPr>
+              <a:t>): </a:t>
+            </a:r>
+            <a:r>
+              <a:rPr lang="en-US" dirty="0">
+                <a:latin typeface="TH SarabunPSK" panose="020B0500040200020003" pitchFamily="34" charset="-34"/>
+                <a:cs typeface="TH SarabunPSK" panose="020B0500040200020003" pitchFamily="34" charset="-34"/>
+              </a:rPr>
+              <a:t>Matrix&lt;</a:t>
+            </a:r>
+            <a:r>
+              <a:rPr lang="en-US" dirty="0" err="1">
+                <a:latin typeface="TH SarabunPSK" panose="020B0500040200020003" pitchFamily="34" charset="-34"/>
+                <a:cs typeface="TH SarabunPSK" panose="020B0500040200020003" pitchFamily="34" charset="-34"/>
+              </a:rPr>
+              <a:t>ushort</a:t>
+            </a:r>
+            <a:r>
+              <a:rPr lang="en-US" dirty="0" smtClean="0">
+                <a:latin typeface="TH SarabunPSK" panose="020B0500040200020003" pitchFamily="34" charset="-34"/>
+                <a:cs typeface="TH SarabunPSK" panose="020B0500040200020003" pitchFamily="34" charset="-34"/>
+              </a:rPr>
+              <a:t>&gt;</a:t>
+            </a:r>
+          </a:p>
+          <a:p>
+            <a:r>
+              <a:rPr lang="en-US" dirty="0" smtClean="0">
+                <a:latin typeface="TH SarabunPSK" panose="020B0500040200020003" pitchFamily="34" charset="-34"/>
+                <a:cs typeface="TH SarabunPSK" panose="020B0500040200020003" pitchFamily="34" charset="-34"/>
+              </a:rPr>
+              <a:t>+</a:t>
+            </a:r>
+            <a:r>
+              <a:rPr lang="en-US" dirty="0">
+                <a:latin typeface="TH SarabunPSK" panose="020B0500040200020003" pitchFamily="34" charset="-34"/>
+                <a:cs typeface="TH SarabunPSK" panose="020B0500040200020003" pitchFamily="34" charset="-34"/>
+              </a:rPr>
+              <a:t> </a:t>
+            </a:r>
+            <a:r>
+              <a:rPr lang="en-US" dirty="0" smtClean="0">
+                <a:latin typeface="TH SarabunPSK" panose="020B0500040200020003" pitchFamily="34" charset="-34"/>
+                <a:cs typeface="TH SarabunPSK" panose="020B0500040200020003" pitchFamily="34" charset="-34"/>
+              </a:rPr>
+              <a:t>StretchImageU16Bit</a:t>
+            </a:r>
+            <a:r>
+              <a:rPr lang="fr-FR" dirty="0">
+                <a:latin typeface="TH SarabunPSK" panose="020B0500040200020003" pitchFamily="34" charset="-34"/>
+                <a:cs typeface="TH SarabunPSK" panose="020B0500040200020003" pitchFamily="34" charset="-34"/>
+              </a:rPr>
+              <a:t> (Matrix&lt;</a:t>
+            </a:r>
+            <a:r>
+              <a:rPr lang="fr-FR" dirty="0" err="1">
+                <a:latin typeface="TH SarabunPSK" panose="020B0500040200020003" pitchFamily="34" charset="-34"/>
+                <a:cs typeface="TH SarabunPSK" panose="020B0500040200020003" pitchFamily="34" charset="-34"/>
+              </a:rPr>
+              <a:t>int</a:t>
+            </a:r>
+            <a:r>
+              <a:rPr lang="fr-FR" dirty="0">
+                <a:latin typeface="TH SarabunPSK" panose="020B0500040200020003" pitchFamily="34" charset="-34"/>
+                <a:cs typeface="TH SarabunPSK" panose="020B0500040200020003" pitchFamily="34" charset="-34"/>
+              </a:rPr>
+              <a:t>&gt; UInt32Image, </a:t>
+            </a:r>
+            <a:r>
+              <a:rPr lang="fr-FR" dirty="0" err="1">
+                <a:latin typeface="TH SarabunPSK" panose="020B0500040200020003" pitchFamily="34" charset="-34"/>
+                <a:cs typeface="TH SarabunPSK" panose="020B0500040200020003" pitchFamily="34" charset="-34"/>
+              </a:rPr>
+              <a:t>int</a:t>
+            </a:r>
+            <a:r>
+              <a:rPr lang="fr-FR" dirty="0">
+                <a:latin typeface="TH SarabunPSK" panose="020B0500040200020003" pitchFamily="34" charset="-34"/>
+                <a:cs typeface="TH SarabunPSK" panose="020B0500040200020003" pitchFamily="34" charset="-34"/>
+              </a:rPr>
+              <a:t> </a:t>
+            </a:r>
+            <a:r>
+              <a:rPr lang="fr-FR" dirty="0" err="1">
+                <a:latin typeface="TH SarabunPSK" panose="020B0500040200020003" pitchFamily="34" charset="-34"/>
+                <a:cs typeface="TH SarabunPSK" panose="020B0500040200020003" pitchFamily="34" charset="-34"/>
+              </a:rPr>
+              <a:t>MinVal</a:t>
+            </a:r>
+            <a:r>
+              <a:rPr lang="fr-FR" dirty="0">
+                <a:latin typeface="TH SarabunPSK" panose="020B0500040200020003" pitchFamily="34" charset="-34"/>
+                <a:cs typeface="TH SarabunPSK" panose="020B0500040200020003" pitchFamily="34" charset="-34"/>
+              </a:rPr>
+              <a:t>, </a:t>
+            </a:r>
+            <a:r>
+              <a:rPr lang="fr-FR" dirty="0" err="1">
+                <a:latin typeface="TH SarabunPSK" panose="020B0500040200020003" pitchFamily="34" charset="-34"/>
+                <a:cs typeface="TH SarabunPSK" panose="020B0500040200020003" pitchFamily="34" charset="-34"/>
+              </a:rPr>
+              <a:t>int</a:t>
+            </a:r>
+            <a:r>
+              <a:rPr lang="fr-FR" dirty="0">
+                <a:latin typeface="TH SarabunPSK" panose="020B0500040200020003" pitchFamily="34" charset="-34"/>
+                <a:cs typeface="TH SarabunPSK" panose="020B0500040200020003" pitchFamily="34" charset="-34"/>
+              </a:rPr>
+              <a:t> </a:t>
+            </a:r>
+            <a:r>
+              <a:rPr lang="fr-FR" dirty="0" err="1">
+                <a:latin typeface="TH SarabunPSK" panose="020B0500040200020003" pitchFamily="34" charset="-34"/>
+                <a:cs typeface="TH SarabunPSK" panose="020B0500040200020003" pitchFamily="34" charset="-34"/>
+              </a:rPr>
+              <a:t>MaxVal</a:t>
+            </a:r>
+            <a:r>
+              <a:rPr lang="fr-FR" dirty="0" smtClean="0">
+                <a:latin typeface="TH SarabunPSK" panose="020B0500040200020003" pitchFamily="34" charset="-34"/>
+                <a:cs typeface="TH SarabunPSK" panose="020B0500040200020003" pitchFamily="34" charset="-34"/>
+              </a:rPr>
+              <a:t>) :</a:t>
+            </a:r>
+            <a:r>
+              <a:rPr lang="en-US" dirty="0"/>
+              <a:t> </a:t>
+            </a:r>
+            <a:r>
+              <a:rPr lang="en-US" dirty="0">
+                <a:latin typeface="TH SarabunPSK" panose="020B0500040200020003" pitchFamily="34" charset="-34"/>
+                <a:cs typeface="TH SarabunPSK" panose="020B0500040200020003" pitchFamily="34" charset="-34"/>
+              </a:rPr>
+              <a:t>Matrix&lt;</a:t>
+            </a:r>
+            <a:r>
+              <a:rPr lang="en-US" dirty="0" err="1">
+                <a:latin typeface="TH SarabunPSK" panose="020B0500040200020003" pitchFamily="34" charset="-34"/>
+                <a:cs typeface="TH SarabunPSK" panose="020B0500040200020003" pitchFamily="34" charset="-34"/>
+              </a:rPr>
+              <a:t>ushort</a:t>
+            </a:r>
+            <a:r>
+              <a:rPr lang="en-US" dirty="0">
+                <a:latin typeface="TH SarabunPSK" panose="020B0500040200020003" pitchFamily="34" charset="-34"/>
+                <a:cs typeface="TH SarabunPSK" panose="020B0500040200020003" pitchFamily="34" charset="-34"/>
+              </a:rPr>
+              <a:t>&gt;</a:t>
+            </a:r>
+            <a:endParaRPr lang="fr-FR" dirty="0" smtClean="0">
+              <a:latin typeface="TH SarabunPSK" panose="020B0500040200020003" pitchFamily="34" charset="-34"/>
+              <a:cs typeface="TH SarabunPSK" panose="020B0500040200020003" pitchFamily="34" charset="-34"/>
+            </a:endParaRPr>
+          </a:p>
+          <a:p>
+            <a:r>
+              <a:rPr lang="fr-FR" dirty="0" smtClean="0">
+                <a:latin typeface="TH SarabunPSK" panose="020B0500040200020003" pitchFamily="34" charset="-34"/>
+                <a:cs typeface="TH SarabunPSK" panose="020B0500040200020003" pitchFamily="34" charset="-34"/>
+              </a:rPr>
+              <a:t>+ </a:t>
+            </a:r>
+            <a:r>
+              <a:rPr lang="en-US" dirty="0" err="1" smtClean="0">
+                <a:latin typeface="TH SarabunPSK" panose="020B0500040200020003" pitchFamily="34" charset="-34"/>
+                <a:cs typeface="TH SarabunPSK" panose="020B0500040200020003" pitchFamily="34" charset="-34"/>
+              </a:rPr>
+              <a:t>GetStrecthProfile</a:t>
+            </a:r>
+            <a:r>
+              <a:rPr lang="en-US" dirty="0">
+                <a:latin typeface="TH SarabunPSK" panose="020B0500040200020003" pitchFamily="34" charset="-34"/>
+                <a:cs typeface="TH SarabunPSK" panose="020B0500040200020003" pitchFamily="34" charset="-34"/>
+              </a:rPr>
+              <a:t> (out Double </a:t>
+            </a:r>
+            <a:r>
+              <a:rPr lang="en-US" dirty="0" err="1">
+                <a:latin typeface="TH SarabunPSK" panose="020B0500040200020003" pitchFamily="34" charset="-34"/>
+                <a:cs typeface="TH SarabunPSK" panose="020B0500040200020003" pitchFamily="34" charset="-34"/>
+              </a:rPr>
+              <a:t>LowerPercen</a:t>
+            </a:r>
+            <a:r>
+              <a:rPr lang="en-US" dirty="0">
+                <a:latin typeface="TH SarabunPSK" panose="020B0500040200020003" pitchFamily="34" charset="-34"/>
+                <a:cs typeface="TH SarabunPSK" panose="020B0500040200020003" pitchFamily="34" charset="-34"/>
+              </a:rPr>
+              <a:t>, out Double </a:t>
+            </a:r>
+            <a:r>
+              <a:rPr lang="en-US" dirty="0" err="1">
+                <a:latin typeface="TH SarabunPSK" panose="020B0500040200020003" pitchFamily="34" charset="-34"/>
+                <a:cs typeface="TH SarabunPSK" panose="020B0500040200020003" pitchFamily="34" charset="-34"/>
+              </a:rPr>
+              <a:t>UpperPercen</a:t>
+            </a:r>
+            <a:r>
+              <a:rPr lang="en-US" dirty="0" smtClean="0">
+                <a:latin typeface="TH SarabunPSK" panose="020B0500040200020003" pitchFamily="34" charset="-34"/>
+                <a:cs typeface="TH SarabunPSK" panose="020B0500040200020003" pitchFamily="34" charset="-34"/>
+              </a:rPr>
+              <a:t>) : void</a:t>
+            </a:r>
+          </a:p>
+          <a:p>
+            <a:r>
+              <a:rPr lang="en-US" dirty="0" smtClean="0">
+                <a:latin typeface="TH SarabunPSK" panose="020B0500040200020003" pitchFamily="34" charset="-34"/>
+                <a:cs typeface="TH SarabunPSK" panose="020B0500040200020003" pitchFamily="34" charset="-34"/>
+              </a:rPr>
+              <a:t>+ GetUpperAndLowerU16Bit(</a:t>
+            </a:r>
+            <a:r>
+              <a:rPr lang="en-US" dirty="0">
+                <a:latin typeface="TH SarabunPSK" panose="020B0500040200020003" pitchFamily="34" charset="-34"/>
+                <a:cs typeface="TH SarabunPSK" panose="020B0500040200020003" pitchFamily="34" charset="-34"/>
+              </a:rPr>
+              <a:t>Matrix&lt;UInt16&gt; </a:t>
+            </a:r>
+            <a:r>
+              <a:rPr lang="en-US" dirty="0" err="1">
+                <a:latin typeface="TH SarabunPSK" panose="020B0500040200020003" pitchFamily="34" charset="-34"/>
+                <a:cs typeface="TH SarabunPSK" panose="020B0500040200020003" pitchFamily="34" charset="-34"/>
+              </a:rPr>
+              <a:t>CVMat</a:t>
+            </a:r>
+            <a:r>
+              <a:rPr lang="en-US" dirty="0">
+                <a:latin typeface="TH SarabunPSK" panose="020B0500040200020003" pitchFamily="34" charset="-34"/>
+                <a:cs typeface="TH SarabunPSK" panose="020B0500040200020003" pitchFamily="34" charset="-34"/>
+              </a:rPr>
+              <a:t>, out UInt16 </a:t>
+            </a:r>
+            <a:r>
+              <a:rPr lang="en-US" dirty="0" err="1">
+                <a:latin typeface="TH SarabunPSK" panose="020B0500040200020003" pitchFamily="34" charset="-34"/>
+                <a:cs typeface="TH SarabunPSK" panose="020B0500040200020003" pitchFamily="34" charset="-34"/>
+              </a:rPr>
+              <a:t>LowerValue</a:t>
+            </a:r>
+            <a:r>
+              <a:rPr lang="en-US" dirty="0">
+                <a:latin typeface="TH SarabunPSK" panose="020B0500040200020003" pitchFamily="34" charset="-34"/>
+                <a:cs typeface="TH SarabunPSK" panose="020B0500040200020003" pitchFamily="34" charset="-34"/>
+              </a:rPr>
+              <a:t>, out UInt16 </a:t>
+            </a:r>
+            <a:r>
+              <a:rPr lang="en-US" dirty="0" err="1">
+                <a:latin typeface="TH SarabunPSK" panose="020B0500040200020003" pitchFamily="34" charset="-34"/>
+                <a:cs typeface="TH SarabunPSK" panose="020B0500040200020003" pitchFamily="34" charset="-34"/>
+              </a:rPr>
+              <a:t>UpperValue</a:t>
+            </a:r>
+            <a:r>
+              <a:rPr lang="en-US" dirty="0">
+                <a:latin typeface="TH SarabunPSK" panose="020B0500040200020003" pitchFamily="34" charset="-34"/>
+                <a:cs typeface="TH SarabunPSK" panose="020B0500040200020003" pitchFamily="34" charset="-34"/>
+              </a:rPr>
+              <a:t>, Double </a:t>
+            </a:r>
+            <a:r>
+              <a:rPr lang="en-US" dirty="0" err="1">
+                <a:latin typeface="TH SarabunPSK" panose="020B0500040200020003" pitchFamily="34" charset="-34"/>
+                <a:cs typeface="TH SarabunPSK" panose="020B0500040200020003" pitchFamily="34" charset="-34"/>
+              </a:rPr>
+              <a:t>LowerPercen</a:t>
+            </a:r>
+            <a:r>
+              <a:rPr lang="en-US" dirty="0">
+                <a:latin typeface="TH SarabunPSK" panose="020B0500040200020003" pitchFamily="34" charset="-34"/>
+                <a:cs typeface="TH SarabunPSK" panose="020B0500040200020003" pitchFamily="34" charset="-34"/>
+              </a:rPr>
+              <a:t>, Double </a:t>
+            </a:r>
+            <a:r>
+              <a:rPr lang="en-US" dirty="0" err="1">
+                <a:latin typeface="TH SarabunPSK" panose="020B0500040200020003" pitchFamily="34" charset="-34"/>
+                <a:cs typeface="TH SarabunPSK" panose="020B0500040200020003" pitchFamily="34" charset="-34"/>
+              </a:rPr>
+              <a:t>UpperPercen</a:t>
+            </a:r>
+            <a:r>
+              <a:rPr lang="en-US" dirty="0" smtClean="0">
+                <a:latin typeface="TH SarabunPSK" panose="020B0500040200020003" pitchFamily="34" charset="-34"/>
+                <a:cs typeface="TH SarabunPSK" panose="020B0500040200020003" pitchFamily="34" charset="-34"/>
+              </a:rPr>
+              <a:t>)</a:t>
+            </a:r>
+            <a:endParaRPr lang="en-US" dirty="0">
+              <a:latin typeface="TH SarabunPSK" panose="020B0500040200020003" pitchFamily="34" charset="-34"/>
+              <a:cs typeface="TH SarabunPSK" panose="020B0500040200020003" pitchFamily="34" charset="-34"/>
+            </a:endParaRPr>
+          </a:p>
+        </p:txBody>
+      </p:sp>
+      <p:cxnSp>
+        <p:nvCxnSpPr>
+          <p:cNvPr id="55" name="ตัวเชื่อมต่อหักมุม 54"/>
+          <p:cNvCxnSpPr>
+            <a:endCxn id="46" idx="1"/>
+          </p:cNvCxnSpPr>
+          <p:nvPr/>
+        </p:nvCxnSpPr>
+        <p:spPr>
+          <a:xfrm>
+            <a:off x="6394756" y="4699977"/>
+            <a:ext cx="953116" cy="714929"/>
+          </a:xfrm>
+          <a:prstGeom prst="bentConnector3">
+            <a:avLst>
+              <a:gd name="adj1" fmla="val 50000"/>
+            </a:avLst>
+          </a:prstGeom>
+        </p:spPr>
+        <p:style>
+          <a:lnRef idx="1">
+            <a:schemeClr val="dk1"/>
+          </a:lnRef>
+          <a:fillRef idx="0">
+            <a:schemeClr val="dk1"/>
+          </a:fillRef>
+          <a:effectRef idx="0">
+            <a:schemeClr val="dk1"/>
+          </a:effectRef>
+          <a:fontRef idx="minor">
+            <a:schemeClr val="tx1"/>
+          </a:fontRef>
+        </p:style>
+      </p:cxnSp>
+      <p:cxnSp>
+        <p:nvCxnSpPr>
+          <p:cNvPr id="63" name="ตัวเชื่อมต่อหักมุม 62"/>
+          <p:cNvCxnSpPr>
+            <a:endCxn id="30" idx="1"/>
+          </p:cNvCxnSpPr>
+          <p:nvPr/>
+        </p:nvCxnSpPr>
+        <p:spPr>
+          <a:xfrm rot="5400000" flipH="1" flipV="1">
+            <a:off x="6420020" y="3756159"/>
+            <a:ext cx="1395113" cy="492524"/>
+          </a:xfrm>
+          <a:prstGeom prst="bentConnector2">
+            <a:avLst/>
+          </a:prstGeom>
+        </p:spPr>
+        <p:style>
+          <a:lnRef idx="1">
+            <a:schemeClr val="dk1"/>
+          </a:lnRef>
+          <a:fillRef idx="0">
+            <a:schemeClr val="dk1"/>
+          </a:fillRef>
+          <a:effectRef idx="0">
+            <a:schemeClr val="dk1"/>
+          </a:effectRef>
+          <a:fontRef idx="minor">
+            <a:schemeClr val="tx1"/>
+          </a:fontRef>
+        </p:style>
+      </p:cxnSp>
+      <p:sp>
+        <p:nvSpPr>
+          <p:cNvPr id="64" name="แผนผังลําดับงาน: การตัดสินใจ 63"/>
+          <p:cNvSpPr/>
+          <p:nvPr/>
+        </p:nvSpPr>
+        <p:spPr>
+          <a:xfrm>
+            <a:off x="6396683" y="4630614"/>
+            <a:ext cx="157568" cy="138723"/>
+          </a:xfrm>
+          <a:prstGeom prst="flowChartDecision">
+            <a:avLst/>
+          </a:prstGeom>
+          <a:solidFill>
+            <a:schemeClr val="bg1"/>
+          </a:solidFill>
+          <a:ln w="9525" cap="flat" cmpd="sng" algn="ctr">
+            <a:solidFill>
+              <a:schemeClr val="dk1"/>
+            </a:solidFill>
+            <a:prstDash val="solid"/>
+            <a:round/>
+            <a:headEnd type="none" w="med" len="med"/>
+            <a:tailEnd type="none" w="med" len="med"/>
+          </a:ln>
+        </p:spPr>
+        <p:style>
+          <a:lnRef idx="0">
+            <a:scrgbClr r="0" g="0" b="0"/>
+          </a:lnRef>
+          <a:fillRef idx="0">
+            <a:scrgbClr r="0" g="0" b="0"/>
+          </a:fillRef>
+          <a:effectRef idx="0">
+            <a:scrgbClr r="0" g="0" b="0"/>
+          </a:effectRef>
+          <a:fontRef idx="minor">
+            <a:schemeClr val="dk1"/>
+          </a:fontRef>
+        </p:style>
+        <p:txBody>
+          <a:bodyPr rtlCol="0" anchor="ctr"/>
+          <a:lstStyle/>
+          <a:p>
+            <a:pPr algn="ctr"/>
+            <a:endParaRPr lang="en-US"/>
           </a:p>
         </p:txBody>
       </p:sp>

</xml_diff>